<commit_message>
bumping npm version (#459)
</commit_message>
<xml_diff>
--- a/docs/language_processing.pptx
+++ b/docs/language_processing.pptx
@@ -243,7 +243,7 @@
           <a:p>
             <a:fld id="{F0190900-4991-7048-B73B-56F36D6D8D4F}" type="datetimeFigureOut">
               <a:rPr lang="en-US" smtClean="0"/>
-              <a:t>3/5/20</a:t>
+              <a:t>3/23/20</a:t>
             </a:fld>
             <a:endParaRPr lang="en-US"/>
           </a:p>
@@ -413,7 +413,7 @@
           <a:p>
             <a:fld id="{F0190900-4991-7048-B73B-56F36D6D8D4F}" type="datetimeFigureOut">
               <a:rPr lang="en-US" smtClean="0"/>
-              <a:t>3/5/20</a:t>
+              <a:t>3/23/20</a:t>
             </a:fld>
             <a:endParaRPr lang="en-US"/>
           </a:p>
@@ -593,7 +593,7 @@
           <a:p>
             <a:fld id="{F0190900-4991-7048-B73B-56F36D6D8D4F}" type="datetimeFigureOut">
               <a:rPr lang="en-US" smtClean="0"/>
-              <a:t>3/5/20</a:t>
+              <a:t>3/23/20</a:t>
             </a:fld>
             <a:endParaRPr lang="en-US"/>
           </a:p>
@@ -763,7 +763,7 @@
           <a:p>
             <a:fld id="{F0190900-4991-7048-B73B-56F36D6D8D4F}" type="datetimeFigureOut">
               <a:rPr lang="en-US" smtClean="0"/>
-              <a:t>3/5/20</a:t>
+              <a:t>3/23/20</a:t>
             </a:fld>
             <a:endParaRPr lang="en-US"/>
           </a:p>
@@ -1007,7 +1007,7 @@
           <a:p>
             <a:fld id="{F0190900-4991-7048-B73B-56F36D6D8D4F}" type="datetimeFigureOut">
               <a:rPr lang="en-US" smtClean="0"/>
-              <a:t>3/5/20</a:t>
+              <a:t>3/23/20</a:t>
             </a:fld>
             <a:endParaRPr lang="en-US"/>
           </a:p>
@@ -1239,7 +1239,7 @@
           <a:p>
             <a:fld id="{F0190900-4991-7048-B73B-56F36D6D8D4F}" type="datetimeFigureOut">
               <a:rPr lang="en-US" smtClean="0"/>
-              <a:t>3/5/20</a:t>
+              <a:t>3/23/20</a:t>
             </a:fld>
             <a:endParaRPr lang="en-US"/>
           </a:p>
@@ -1606,7 +1606,7 @@
           <a:p>
             <a:fld id="{F0190900-4991-7048-B73B-56F36D6D8D4F}" type="datetimeFigureOut">
               <a:rPr lang="en-US" smtClean="0"/>
-              <a:t>3/5/20</a:t>
+              <a:t>3/23/20</a:t>
             </a:fld>
             <a:endParaRPr lang="en-US"/>
           </a:p>
@@ -1724,7 +1724,7 @@
           <a:p>
             <a:fld id="{F0190900-4991-7048-B73B-56F36D6D8D4F}" type="datetimeFigureOut">
               <a:rPr lang="en-US" smtClean="0"/>
-              <a:t>3/5/20</a:t>
+              <a:t>3/23/20</a:t>
             </a:fld>
             <a:endParaRPr lang="en-US"/>
           </a:p>
@@ -1819,7 +1819,7 @@
           <a:p>
             <a:fld id="{F0190900-4991-7048-B73B-56F36D6D8D4F}" type="datetimeFigureOut">
               <a:rPr lang="en-US" smtClean="0"/>
-              <a:t>3/5/20</a:t>
+              <a:t>3/23/20</a:t>
             </a:fld>
             <a:endParaRPr lang="en-US"/>
           </a:p>
@@ -2096,7 +2096,7 @@
           <a:p>
             <a:fld id="{F0190900-4991-7048-B73B-56F36D6D8D4F}" type="datetimeFigureOut">
               <a:rPr lang="en-US" smtClean="0"/>
-              <a:t>3/5/20</a:t>
+              <a:t>3/23/20</a:t>
             </a:fld>
             <a:endParaRPr lang="en-US"/>
           </a:p>
@@ -2353,7 +2353,7 @@
           <a:p>
             <a:fld id="{F0190900-4991-7048-B73B-56F36D6D8D4F}" type="datetimeFigureOut">
               <a:rPr lang="en-US" smtClean="0"/>
-              <a:t>3/5/20</a:t>
+              <a:t>3/23/20</a:t>
             </a:fld>
             <a:endParaRPr lang="en-US"/>
           </a:p>
@@ -2566,7 +2566,7 @@
           <a:p>
             <a:fld id="{F0190900-4991-7048-B73B-56F36D6D8D4F}" type="datetimeFigureOut">
               <a:rPr lang="en-US" smtClean="0"/>
-              <a:t>3/5/20</a:t>
+              <a:t>3/23/20</a:t>
             </a:fld>
             <a:endParaRPr lang="en-US"/>
           </a:p>
@@ -3026,8 +3026,8 @@
         </p:nvSpPr>
         <p:spPr>
           <a:xfrm>
-            <a:off x="2668150" y="1920109"/>
-            <a:ext cx="1480876" cy="284052"/>
+            <a:off x="5423512" y="1125033"/>
+            <a:ext cx="1211154" cy="284052"/>
           </a:xfrm>
           <a:prstGeom prst="rect">
             <a:avLst/>
@@ -3073,8 +3073,8 @@
         </p:nvSpPr>
         <p:spPr>
           <a:xfrm>
-            <a:off x="2668150" y="2715185"/>
-            <a:ext cx="1480876" cy="284052"/>
+            <a:off x="5423512" y="2094749"/>
+            <a:ext cx="1211153" cy="284052"/>
           </a:xfrm>
           <a:prstGeom prst="rect">
             <a:avLst/>
@@ -3604,22 +3604,22 @@
           </p:cNvPr>
           <p:cNvCxnSpPr>
             <a:cxnSpLocks/>
-            <a:stCxn id="8" idx="2"/>
+            <a:stCxn id="6" idx="2"/>
             <a:endCxn id="11" idx="0"/>
           </p:cNvCxnSpPr>
           <p:nvPr/>
         </p:nvCxnSpPr>
         <p:spPr>
           <a:xfrm>
-            <a:off x="3408588" y="2999237"/>
-            <a:ext cx="541660" cy="605852"/>
+            <a:off x="3408588" y="1409085"/>
+            <a:ext cx="541660" cy="2196004"/>
           </a:xfrm>
           <a:prstGeom prst="straightConnector1">
             <a:avLst/>
           </a:prstGeom>
           <a:ln w="25400">
             <a:solidFill>
-              <a:schemeClr val="tx1"/>
+              <a:schemeClr val="accent1"/>
             </a:solidFill>
             <a:tailEnd type="triangle"/>
           </a:ln>
@@ -3650,22 +3650,22 @@
           </p:cNvPr>
           <p:cNvCxnSpPr>
             <a:cxnSpLocks/>
-            <a:stCxn id="8" idx="2"/>
+            <a:stCxn id="6" idx="2"/>
             <a:endCxn id="9" idx="0"/>
           </p:cNvCxnSpPr>
           <p:nvPr/>
         </p:nvCxnSpPr>
         <p:spPr>
           <a:xfrm flipH="1">
-            <a:off x="3057676" y="2999237"/>
-            <a:ext cx="350912" cy="609599"/>
+            <a:off x="3057676" y="1409085"/>
+            <a:ext cx="350912" cy="2199751"/>
           </a:xfrm>
           <a:prstGeom prst="straightConnector1">
             <a:avLst/>
           </a:prstGeom>
           <a:ln w="25400">
             <a:solidFill>
-              <a:schemeClr val="tx1"/>
+              <a:schemeClr val="accent1"/>
             </a:solidFill>
             <a:tailEnd type="triangle"/>
           </a:ln>
@@ -3696,22 +3696,22 @@
           </p:cNvPr>
           <p:cNvCxnSpPr>
             <a:cxnSpLocks/>
-            <a:stCxn id="8" idx="2"/>
+            <a:stCxn id="6" idx="2"/>
             <a:endCxn id="10" idx="0"/>
           </p:cNvCxnSpPr>
           <p:nvPr/>
         </p:nvCxnSpPr>
         <p:spPr>
           <a:xfrm flipH="1">
-            <a:off x="2098264" y="2999237"/>
-            <a:ext cx="1310324" cy="615615"/>
+            <a:off x="2098264" y="1409085"/>
+            <a:ext cx="1310324" cy="2205767"/>
           </a:xfrm>
           <a:prstGeom prst="straightConnector1">
             <a:avLst/>
           </a:prstGeom>
           <a:ln w="25400">
             <a:solidFill>
-              <a:schemeClr val="tx1"/>
+              <a:schemeClr val="accent1"/>
             </a:solidFill>
             <a:tailEnd type="triangle"/>
           </a:ln>
@@ -3742,15 +3742,15 @@
           </p:cNvPr>
           <p:cNvCxnSpPr>
             <a:cxnSpLocks/>
-            <a:stCxn id="6" idx="2"/>
-            <a:endCxn id="7" idx="0"/>
+            <a:stCxn id="6" idx="3"/>
+            <a:endCxn id="7" idx="1"/>
           </p:cNvCxnSpPr>
           <p:nvPr/>
         </p:nvCxnSpPr>
         <p:spPr>
           <a:xfrm>
-            <a:off x="3408588" y="1409085"/>
-            <a:ext cx="0" cy="511024"/>
+            <a:off x="4149026" y="1267059"/>
+            <a:ext cx="1274486" cy="0"/>
           </a:xfrm>
           <a:prstGeom prst="straightConnector1">
             <a:avLst/>
@@ -3789,13 +3789,14 @@
           <p:cNvCxnSpPr>
             <a:cxnSpLocks/>
             <a:stCxn id="7" idx="2"/>
+            <a:endCxn id="8" idx="0"/>
           </p:cNvCxnSpPr>
           <p:nvPr/>
         </p:nvCxnSpPr>
         <p:spPr>
           <a:xfrm>
-            <a:off x="3408588" y="2204161"/>
-            <a:ext cx="0" cy="506781"/>
+            <a:off x="6029089" y="1409085"/>
+            <a:ext cx="0" cy="685664"/>
           </a:xfrm>
           <a:prstGeom prst="straightConnector1">
             <a:avLst/>
@@ -3950,10 +3951,10 @@
       </p:sp>
       <p:sp>
         <p:nvSpPr>
-          <p:cNvPr id="25" name="TextBox 24">
-            <a:extLst>
-              <a:ext uri="{FF2B5EF4-FFF2-40B4-BE49-F238E27FC236}">
-                <a16:creationId xmlns:a16="http://schemas.microsoft.com/office/drawing/2014/main" id="{5178AA69-2610-0D4D-AB67-8EEFBBCB2AC2}"/>
+          <p:cNvPr id="30" name="TextBox 29">
+            <a:extLst>
+              <a:ext uri="{FF2B5EF4-FFF2-40B4-BE49-F238E27FC236}">
+                <a16:creationId xmlns:a16="http://schemas.microsoft.com/office/drawing/2014/main" id="{E8F0E5AE-3282-AD41-8963-D3DF78346A7B}"/>
               </a:ext>
             </a:extLst>
           </p:cNvPr>
@@ -3962,15 +3963,17 @@
         </p:nvSpPr>
         <p:spPr>
           <a:xfrm>
-            <a:off x="3448154" y="1437190"/>
-            <a:ext cx="801199" cy="475771"/>
+            <a:off x="5156808" y="326053"/>
+            <a:ext cx="1105300" cy="284052"/>
           </a:xfrm>
           <a:prstGeom prst="rect">
             <a:avLst/>
           </a:prstGeom>
           <a:noFill/>
           <a:ln w="25400">
-            <a:noFill/>
+            <a:solidFill>
+              <a:srgbClr val="C00000"/>
+            </a:solidFill>
           </a:ln>
         </p:spPr>
         <p:txBody>
@@ -3982,17 +3985,17 @@
             <a:pPr algn="ctr"/>
             <a:r>
               <a:rPr lang="en-US" sz="1246" dirty="0"/>
-              <a:t>syntax tree</a:t>
-            </a:r>
-          </a:p>
-        </p:txBody>
-      </p:sp>
-      <p:sp>
-        <p:nvSpPr>
-          <p:cNvPr id="27" name="TextBox 26">
-            <a:extLst>
-              <a:ext uri="{FF2B5EF4-FFF2-40B4-BE49-F238E27FC236}">
-                <a16:creationId xmlns:a16="http://schemas.microsoft.com/office/drawing/2014/main" id="{8A31928C-A87D-E746-89B9-9A3B69F7F4EE}"/>
+              <a:t>Syntax Error</a:t>
+            </a:r>
+          </a:p>
+        </p:txBody>
+      </p:sp>
+      <p:sp>
+        <p:nvSpPr>
+          <p:cNvPr id="31" name="TextBox 30">
+            <a:extLst>
+              <a:ext uri="{FF2B5EF4-FFF2-40B4-BE49-F238E27FC236}">
+                <a16:creationId xmlns:a16="http://schemas.microsoft.com/office/drawing/2014/main" id="{D8F95F11-120C-2245-A571-A07F38CD9134}"/>
               </a:ext>
             </a:extLst>
           </p:cNvPr>
@@ -4001,15 +4004,17 @@
         </p:nvSpPr>
         <p:spPr>
           <a:xfrm>
-            <a:off x="3450273" y="2232266"/>
-            <a:ext cx="913008" cy="475771"/>
+            <a:off x="4160792" y="1661788"/>
+            <a:ext cx="1105300" cy="284052"/>
           </a:xfrm>
           <a:prstGeom prst="rect">
             <a:avLst/>
           </a:prstGeom>
           <a:noFill/>
           <a:ln w="25400">
-            <a:noFill/>
+            <a:solidFill>
+              <a:srgbClr val="C00000"/>
+            </a:solidFill>
           </a:ln>
         </p:spPr>
         <p:txBody>
@@ -4021,130 +4026,7 @@
             <a:pPr algn="ctr"/>
             <a:r>
               <a:rPr lang="en-US" sz="1246" dirty="0"/>
-              <a:t>validated syntax tree</a:t>
-            </a:r>
-          </a:p>
-        </p:txBody>
-      </p:sp>
-      <p:sp>
-        <p:nvSpPr>
-          <p:cNvPr id="30" name="TextBox 29">
-            <a:extLst>
-              <a:ext uri="{FF2B5EF4-FFF2-40B4-BE49-F238E27FC236}">
-                <a16:creationId xmlns:a16="http://schemas.microsoft.com/office/drawing/2014/main" id="{E8F0E5AE-3282-AD41-8963-D3DF78346A7B}"/>
-              </a:ext>
-            </a:extLst>
-          </p:cNvPr>
-          <p:cNvSpPr txBox="1"/>
-          <p:nvPr/>
-        </p:nvSpPr>
-        <p:spPr>
-          <a:xfrm>
-            <a:off x="5156808" y="727495"/>
-            <a:ext cx="1105300" cy="284052"/>
-          </a:xfrm>
-          <a:prstGeom prst="rect">
-            <a:avLst/>
-          </a:prstGeom>
-          <a:noFill/>
-          <a:ln w="25400">
-            <a:solidFill>
-              <a:srgbClr val="C00000"/>
-            </a:solidFill>
-          </a:ln>
-        </p:spPr>
-        <p:txBody>
-          <a:bodyPr wrap="square" rtlCol="0">
-            <a:spAutoFit/>
-          </a:bodyPr>
-          <a:lstStyle/>
-          <a:p>
-            <a:pPr algn="ctr"/>
-            <a:r>
-              <a:rPr lang="en-US" sz="1246" dirty="0"/>
-              <a:t>Syntax Error</a:t>
-            </a:r>
-          </a:p>
-        </p:txBody>
-      </p:sp>
-      <p:sp>
-        <p:nvSpPr>
-          <p:cNvPr id="31" name="TextBox 30">
-            <a:extLst>
-              <a:ext uri="{FF2B5EF4-FFF2-40B4-BE49-F238E27FC236}">
-                <a16:creationId xmlns:a16="http://schemas.microsoft.com/office/drawing/2014/main" id="{D8F95F11-120C-2245-A571-A07F38CD9134}"/>
-              </a:ext>
-            </a:extLst>
-          </p:cNvPr>
-          <p:cNvSpPr txBox="1"/>
-          <p:nvPr/>
-        </p:nvSpPr>
-        <p:spPr>
-          <a:xfrm>
-            <a:off x="5136477" y="1920109"/>
-            <a:ext cx="1105300" cy="284052"/>
-          </a:xfrm>
-          <a:prstGeom prst="rect">
-            <a:avLst/>
-          </a:prstGeom>
-          <a:noFill/>
-          <a:ln w="25400">
-            <a:solidFill>
-              <a:srgbClr val="C00000"/>
-            </a:solidFill>
-          </a:ln>
-        </p:spPr>
-        <p:txBody>
-          <a:bodyPr wrap="square" rtlCol="0">
-            <a:spAutoFit/>
-          </a:bodyPr>
-          <a:lstStyle/>
-          <a:p>
-            <a:pPr algn="ctr"/>
-            <a:r>
-              <a:rPr lang="en-US" sz="1246" dirty="0"/>
               <a:t>Validity Error</a:t>
-            </a:r>
-          </a:p>
-        </p:txBody>
-      </p:sp>
-      <p:sp>
-        <p:nvSpPr>
-          <p:cNvPr id="35" name="TextBox 34">
-            <a:extLst>
-              <a:ext uri="{FF2B5EF4-FFF2-40B4-BE49-F238E27FC236}">
-                <a16:creationId xmlns:a16="http://schemas.microsoft.com/office/drawing/2014/main" id="{A8BC5CD6-71E8-0D47-9932-1FBCF26859B0}"/>
-              </a:ext>
-            </a:extLst>
-          </p:cNvPr>
-          <p:cNvSpPr txBox="1"/>
-          <p:nvPr/>
-        </p:nvSpPr>
-        <p:spPr>
-          <a:xfrm>
-            <a:off x="5136477" y="2707833"/>
-            <a:ext cx="1105300" cy="284052"/>
-          </a:xfrm>
-          <a:prstGeom prst="rect">
-            <a:avLst/>
-          </a:prstGeom>
-          <a:noFill/>
-          <a:ln w="25400">
-            <a:solidFill>
-              <a:srgbClr val="C00000"/>
-            </a:solidFill>
-          </a:ln>
-        </p:spPr>
-        <p:txBody>
-          <a:bodyPr wrap="square" rtlCol="0">
-            <a:spAutoFit/>
-          </a:bodyPr>
-          <a:lstStyle/>
-          <a:p>
-            <a:pPr algn="ctr"/>
-            <a:r>
-              <a:rPr lang="en-US" sz="1246" dirty="0"/>
-              <a:t>Type Error</a:t>
             </a:r>
           </a:p>
         </p:txBody>
@@ -4160,22 +4042,22 @@
           </p:cNvPr>
           <p:cNvCxnSpPr>
             <a:cxnSpLocks/>
-            <a:stCxn id="8" idx="2"/>
+            <a:stCxn id="6" idx="2"/>
             <a:endCxn id="40" idx="0"/>
           </p:cNvCxnSpPr>
           <p:nvPr/>
         </p:nvCxnSpPr>
         <p:spPr>
           <a:xfrm>
-            <a:off x="3408588" y="2999237"/>
-            <a:ext cx="1504408" cy="605075"/>
+            <a:off x="3408588" y="1409085"/>
+            <a:ext cx="1504408" cy="2195227"/>
           </a:xfrm>
           <a:prstGeom prst="straightConnector1">
             <a:avLst/>
           </a:prstGeom>
           <a:ln w="25400">
             <a:solidFill>
-              <a:schemeClr val="tx1"/>
+              <a:schemeClr val="accent1"/>
             </a:solidFill>
             <a:tailEnd type="triangle"/>
           </a:ln>
@@ -4873,8 +4755,8 @@
         </p:nvCxnSpPr>
         <p:spPr>
           <a:xfrm flipV="1">
-            <a:off x="4149026" y="869521"/>
-            <a:ext cx="1007782" cy="397538"/>
+            <a:off x="4149026" y="468079"/>
+            <a:ext cx="1007782" cy="798980"/>
           </a:xfrm>
           <a:prstGeom prst="straightConnector1">
             <a:avLst/>
@@ -4912,15 +4794,15 @@
           </p:cNvPr>
           <p:cNvCxnSpPr>
             <a:cxnSpLocks/>
-            <a:stCxn id="7" idx="3"/>
-            <a:endCxn id="31" idx="1"/>
+            <a:stCxn id="7" idx="2"/>
+            <a:endCxn id="31" idx="0"/>
           </p:cNvCxnSpPr>
           <p:nvPr/>
         </p:nvCxnSpPr>
         <p:spPr>
-          <a:xfrm>
-            <a:off x="4149026" y="2062135"/>
-            <a:ext cx="987451" cy="0"/>
+          <a:xfrm flipH="1">
+            <a:off x="4713442" y="1409085"/>
+            <a:ext cx="1315647" cy="252703"/>
           </a:xfrm>
           <a:prstGeom prst="straightConnector1">
             <a:avLst/>
@@ -4928,6 +4810,1406 @@
           <a:ln w="25400">
             <a:solidFill>
               <a:srgbClr val="C00000"/>
+            </a:solidFill>
+            <a:tailEnd type="triangle"/>
+          </a:ln>
+        </p:spPr>
+        <p:style>
+          <a:lnRef idx="1">
+            <a:schemeClr val="accent1"/>
+          </a:lnRef>
+          <a:fillRef idx="0">
+            <a:schemeClr val="accent1"/>
+          </a:fillRef>
+          <a:effectRef idx="0">
+            <a:schemeClr val="accent1"/>
+          </a:effectRef>
+          <a:fontRef idx="minor">
+            <a:schemeClr val="tx1"/>
+          </a:fontRef>
+        </p:style>
+      </p:cxnSp>
+      <p:cxnSp>
+        <p:nvCxnSpPr>
+          <p:cNvPr id="84" name="Straight Connector 83">
+            <a:extLst>
+              <a:ext uri="{FF2B5EF4-FFF2-40B4-BE49-F238E27FC236}">
+                <a16:creationId xmlns:a16="http://schemas.microsoft.com/office/drawing/2014/main" id="{3E201E5D-3A52-6240-944A-EC465034ABB4}"/>
+              </a:ext>
+            </a:extLst>
+          </p:cNvPr>
+          <p:cNvCxnSpPr>
+            <a:cxnSpLocks/>
+            <a:stCxn id="50" idx="2"/>
+            <a:endCxn id="53" idx="1"/>
+          </p:cNvCxnSpPr>
+          <p:nvPr/>
+        </p:nvCxnSpPr>
+        <p:spPr>
+          <a:xfrm>
+            <a:off x="1990648" y="5282931"/>
+            <a:ext cx="2014810" cy="967690"/>
+          </a:xfrm>
+          <a:prstGeom prst="line">
+            <a:avLst/>
+          </a:prstGeom>
+          <a:ln w="25400">
+            <a:solidFill>
+              <a:srgbClr val="7030A0"/>
+            </a:solidFill>
+          </a:ln>
+        </p:spPr>
+        <p:style>
+          <a:lnRef idx="1">
+            <a:schemeClr val="accent1"/>
+          </a:lnRef>
+          <a:fillRef idx="0">
+            <a:schemeClr val="accent1"/>
+          </a:fillRef>
+          <a:effectRef idx="0">
+            <a:schemeClr val="accent1"/>
+          </a:effectRef>
+          <a:fontRef idx="minor">
+            <a:schemeClr val="tx1"/>
+          </a:fontRef>
+        </p:style>
+      </p:cxnSp>
+      <p:cxnSp>
+        <p:nvCxnSpPr>
+          <p:cNvPr id="87" name="Straight Connector 86">
+            <a:extLst>
+              <a:ext uri="{FF2B5EF4-FFF2-40B4-BE49-F238E27FC236}">
+                <a16:creationId xmlns:a16="http://schemas.microsoft.com/office/drawing/2014/main" id="{81D3CE61-74AC-654E-A954-04F5A25871C2}"/>
+              </a:ext>
+            </a:extLst>
+          </p:cNvPr>
+          <p:cNvCxnSpPr>
+            <a:cxnSpLocks/>
+            <a:stCxn id="51" idx="2"/>
+            <a:endCxn id="53" idx="1"/>
+          </p:cNvCxnSpPr>
+          <p:nvPr/>
+        </p:nvCxnSpPr>
+        <p:spPr>
+          <a:xfrm>
+            <a:off x="2831934" y="5279553"/>
+            <a:ext cx="1173524" cy="971068"/>
+          </a:xfrm>
+          <a:prstGeom prst="line">
+            <a:avLst/>
+          </a:prstGeom>
+          <a:ln w="25400">
+            <a:solidFill>
+              <a:srgbClr val="7030A0"/>
+            </a:solidFill>
+          </a:ln>
+        </p:spPr>
+        <p:style>
+          <a:lnRef idx="1">
+            <a:schemeClr val="accent1"/>
+          </a:lnRef>
+          <a:fillRef idx="0">
+            <a:schemeClr val="accent1"/>
+          </a:fillRef>
+          <a:effectRef idx="0">
+            <a:schemeClr val="accent1"/>
+          </a:effectRef>
+          <a:fontRef idx="minor">
+            <a:schemeClr val="tx1"/>
+          </a:fontRef>
+        </p:style>
+      </p:cxnSp>
+      <p:cxnSp>
+        <p:nvCxnSpPr>
+          <p:cNvPr id="90" name="Straight Connector 89">
+            <a:extLst>
+              <a:ext uri="{FF2B5EF4-FFF2-40B4-BE49-F238E27FC236}">
+                <a16:creationId xmlns:a16="http://schemas.microsoft.com/office/drawing/2014/main" id="{23C39604-D793-BE47-8401-37EDF6F17520}"/>
+              </a:ext>
+            </a:extLst>
+          </p:cNvPr>
+          <p:cNvCxnSpPr>
+            <a:cxnSpLocks/>
+            <a:stCxn id="52" idx="2"/>
+            <a:endCxn id="53" idx="1"/>
+          </p:cNvCxnSpPr>
+          <p:nvPr/>
+        </p:nvCxnSpPr>
+        <p:spPr>
+          <a:xfrm>
+            <a:off x="3632134" y="5279553"/>
+            <a:ext cx="373324" cy="971068"/>
+          </a:xfrm>
+          <a:prstGeom prst="line">
+            <a:avLst/>
+          </a:prstGeom>
+          <a:ln w="25400">
+            <a:solidFill>
+              <a:srgbClr val="7030A0"/>
+            </a:solidFill>
+          </a:ln>
+        </p:spPr>
+        <p:style>
+          <a:lnRef idx="1">
+            <a:schemeClr val="accent1"/>
+          </a:lnRef>
+          <a:fillRef idx="0">
+            <a:schemeClr val="accent1"/>
+          </a:fillRef>
+          <a:effectRef idx="0">
+            <a:schemeClr val="accent1"/>
+          </a:effectRef>
+          <a:fontRef idx="minor">
+            <a:schemeClr val="tx1"/>
+          </a:fontRef>
+        </p:style>
+      </p:cxnSp>
+      <p:cxnSp>
+        <p:nvCxnSpPr>
+          <p:cNvPr id="93" name="Straight Connector 92">
+            <a:extLst>
+              <a:ext uri="{FF2B5EF4-FFF2-40B4-BE49-F238E27FC236}">
+                <a16:creationId xmlns:a16="http://schemas.microsoft.com/office/drawing/2014/main" id="{FF908778-6272-8948-952D-B59E8DD49D61}"/>
+              </a:ext>
+            </a:extLst>
+          </p:cNvPr>
+          <p:cNvCxnSpPr>
+            <a:cxnSpLocks/>
+            <a:stCxn id="61" idx="2"/>
+            <a:endCxn id="53" idx="3"/>
+          </p:cNvCxnSpPr>
+          <p:nvPr/>
+        </p:nvCxnSpPr>
+        <p:spPr>
+          <a:xfrm flipH="1">
+            <a:off x="4912996" y="5299010"/>
+            <a:ext cx="360756" cy="951611"/>
+          </a:xfrm>
+          <a:prstGeom prst="line">
+            <a:avLst/>
+          </a:prstGeom>
+          <a:ln w="25400">
+            <a:solidFill>
+              <a:srgbClr val="7030A0"/>
+            </a:solidFill>
+          </a:ln>
+        </p:spPr>
+        <p:style>
+          <a:lnRef idx="1">
+            <a:schemeClr val="accent1"/>
+          </a:lnRef>
+          <a:fillRef idx="0">
+            <a:schemeClr val="accent1"/>
+          </a:fillRef>
+          <a:effectRef idx="0">
+            <a:schemeClr val="accent1"/>
+          </a:effectRef>
+          <a:fontRef idx="minor">
+            <a:schemeClr val="tx1"/>
+          </a:fontRef>
+        </p:style>
+      </p:cxnSp>
+      <p:cxnSp>
+        <p:nvCxnSpPr>
+          <p:cNvPr id="96" name="Straight Arrow Connector 95">
+            <a:extLst>
+              <a:ext uri="{FF2B5EF4-FFF2-40B4-BE49-F238E27FC236}">
+                <a16:creationId xmlns:a16="http://schemas.microsoft.com/office/drawing/2014/main" id="{95061FDC-70AB-7C47-A338-B602D587B1B1}"/>
+              </a:ext>
+            </a:extLst>
+          </p:cNvPr>
+          <p:cNvCxnSpPr>
+            <a:cxnSpLocks/>
+            <a:stCxn id="33" idx="3"/>
+            <a:endCxn id="30" idx="1"/>
+          </p:cNvCxnSpPr>
+          <p:nvPr/>
+        </p:nvCxnSpPr>
+        <p:spPr>
+          <a:xfrm flipV="1">
+            <a:off x="4149026" y="468079"/>
+            <a:ext cx="1007782" cy="3904"/>
+          </a:xfrm>
+          <a:prstGeom prst="straightConnector1">
+            <a:avLst/>
+          </a:prstGeom>
+          <a:ln w="25400">
+            <a:solidFill>
+              <a:srgbClr val="C00000"/>
+            </a:solidFill>
+            <a:tailEnd type="triangle"/>
+          </a:ln>
+        </p:spPr>
+        <p:style>
+          <a:lnRef idx="1">
+            <a:schemeClr val="accent1"/>
+          </a:lnRef>
+          <a:fillRef idx="0">
+            <a:schemeClr val="accent1"/>
+          </a:fillRef>
+          <a:effectRef idx="0">
+            <a:schemeClr val="accent1"/>
+          </a:effectRef>
+          <a:fontRef idx="minor">
+            <a:schemeClr val="tx1"/>
+          </a:fontRef>
+        </p:style>
+      </p:cxnSp>
+      <p:cxnSp>
+        <p:nvCxnSpPr>
+          <p:cNvPr id="99" name="Straight Connector 98">
+            <a:extLst>
+              <a:ext uri="{FF2B5EF4-FFF2-40B4-BE49-F238E27FC236}">
+                <a16:creationId xmlns:a16="http://schemas.microsoft.com/office/drawing/2014/main" id="{F47E7D87-7B53-8C42-872F-61C9456CBD58}"/>
+              </a:ext>
+            </a:extLst>
+          </p:cNvPr>
+          <p:cNvCxnSpPr>
+            <a:cxnSpLocks/>
+            <a:stCxn id="10" idx="2"/>
+            <a:endCxn id="50" idx="0"/>
+          </p:cNvCxnSpPr>
+          <p:nvPr/>
+        </p:nvCxnSpPr>
+        <p:spPr>
+          <a:xfrm flipH="1">
+            <a:off x="1990648" y="4074544"/>
+            <a:ext cx="107616" cy="748695"/>
+          </a:xfrm>
+          <a:prstGeom prst="line">
+            <a:avLst/>
+          </a:prstGeom>
+          <a:ln w="25400">
+            <a:solidFill>
+              <a:srgbClr val="7030A0"/>
+            </a:solidFill>
+          </a:ln>
+        </p:spPr>
+        <p:style>
+          <a:lnRef idx="1">
+            <a:schemeClr val="accent1"/>
+          </a:lnRef>
+          <a:fillRef idx="0">
+            <a:schemeClr val="accent1"/>
+          </a:fillRef>
+          <a:effectRef idx="0">
+            <a:schemeClr val="accent1"/>
+          </a:effectRef>
+          <a:fontRef idx="minor">
+            <a:schemeClr val="tx1"/>
+          </a:fontRef>
+        </p:style>
+      </p:cxnSp>
+      <p:cxnSp>
+        <p:nvCxnSpPr>
+          <p:cNvPr id="102" name="Straight Connector 101">
+            <a:extLst>
+              <a:ext uri="{FF2B5EF4-FFF2-40B4-BE49-F238E27FC236}">
+                <a16:creationId xmlns:a16="http://schemas.microsoft.com/office/drawing/2014/main" id="{F1B56F13-7783-4240-AEBA-C78DFE08663C}"/>
+              </a:ext>
+            </a:extLst>
+          </p:cNvPr>
+          <p:cNvCxnSpPr>
+            <a:cxnSpLocks/>
+            <a:stCxn id="10" idx="2"/>
+            <a:endCxn id="51" idx="0"/>
+          </p:cNvCxnSpPr>
+          <p:nvPr/>
+        </p:nvCxnSpPr>
+        <p:spPr>
+          <a:xfrm>
+            <a:off x="2098264" y="4074544"/>
+            <a:ext cx="733670" cy="745317"/>
+          </a:xfrm>
+          <a:prstGeom prst="line">
+            <a:avLst/>
+          </a:prstGeom>
+          <a:ln w="25400">
+            <a:solidFill>
+              <a:srgbClr val="7030A0"/>
+            </a:solidFill>
+          </a:ln>
+        </p:spPr>
+        <p:style>
+          <a:lnRef idx="1">
+            <a:schemeClr val="accent1"/>
+          </a:lnRef>
+          <a:fillRef idx="0">
+            <a:schemeClr val="accent1"/>
+          </a:fillRef>
+          <a:effectRef idx="0">
+            <a:schemeClr val="accent1"/>
+          </a:effectRef>
+          <a:fontRef idx="minor">
+            <a:schemeClr val="tx1"/>
+          </a:fontRef>
+        </p:style>
+      </p:cxnSp>
+      <p:cxnSp>
+        <p:nvCxnSpPr>
+          <p:cNvPr id="105" name="Straight Connector 104">
+            <a:extLst>
+              <a:ext uri="{FF2B5EF4-FFF2-40B4-BE49-F238E27FC236}">
+                <a16:creationId xmlns:a16="http://schemas.microsoft.com/office/drawing/2014/main" id="{BDC04963-951E-6A48-9B99-C6B1DE6CB8AE}"/>
+              </a:ext>
+            </a:extLst>
+          </p:cNvPr>
+          <p:cNvCxnSpPr>
+            <a:cxnSpLocks/>
+            <a:stCxn id="9" idx="2"/>
+            <a:endCxn id="52" idx="0"/>
+          </p:cNvCxnSpPr>
+          <p:nvPr/>
+        </p:nvCxnSpPr>
+        <p:spPr>
+          <a:xfrm>
+            <a:off x="3057676" y="4080081"/>
+            <a:ext cx="574458" cy="739780"/>
+          </a:xfrm>
+          <a:prstGeom prst="line">
+            <a:avLst/>
+          </a:prstGeom>
+          <a:ln w="25400">
+            <a:solidFill>
+              <a:srgbClr val="7030A0"/>
+            </a:solidFill>
+          </a:ln>
+        </p:spPr>
+        <p:style>
+          <a:lnRef idx="1">
+            <a:schemeClr val="accent1"/>
+          </a:lnRef>
+          <a:fillRef idx="0">
+            <a:schemeClr val="accent1"/>
+          </a:fillRef>
+          <a:effectRef idx="0">
+            <a:schemeClr val="accent1"/>
+          </a:effectRef>
+          <a:fontRef idx="minor">
+            <a:schemeClr val="tx1"/>
+          </a:fontRef>
+        </p:style>
+      </p:cxnSp>
+      <p:sp>
+        <p:nvSpPr>
+          <p:cNvPr id="108" name="TextBox 107">
+            <a:extLst>
+              <a:ext uri="{FF2B5EF4-FFF2-40B4-BE49-F238E27FC236}">
+                <a16:creationId xmlns:a16="http://schemas.microsoft.com/office/drawing/2014/main" id="{6B29116E-6C77-6544-81BA-B8133F71421A}"/>
+              </a:ext>
+            </a:extLst>
+          </p:cNvPr>
+          <p:cNvSpPr txBox="1"/>
+          <p:nvPr/>
+        </p:nvSpPr>
+        <p:spPr>
+          <a:xfrm>
+            <a:off x="1946546" y="4225497"/>
+            <a:ext cx="1472759" cy="284052"/>
+          </a:xfrm>
+          <a:prstGeom prst="rect">
+            <a:avLst/>
+          </a:prstGeom>
+          <a:solidFill>
+            <a:schemeClr val="bg1">
+              <a:alpha val="76000"/>
+            </a:schemeClr>
+          </a:solidFill>
+          <a:ln w="25400">
+            <a:noFill/>
+          </a:ln>
+        </p:spPr>
+        <p:txBody>
+          <a:bodyPr wrap="square" rtlCol="0">
+            <a:spAutoFit/>
+          </a:bodyPr>
+          <a:lstStyle/>
+          <a:p>
+            <a:pPr algn="ctr"/>
+            <a:r>
+              <a:rPr lang="en-US" sz="1246" dirty="0"/>
+              <a:t>interacting     with</a:t>
+            </a:r>
+          </a:p>
+        </p:txBody>
+      </p:sp>
+      <p:sp>
+        <p:nvSpPr>
+          <p:cNvPr id="109" name="TextBox 108">
+            <a:extLst>
+              <a:ext uri="{FF2B5EF4-FFF2-40B4-BE49-F238E27FC236}">
+                <a16:creationId xmlns:a16="http://schemas.microsoft.com/office/drawing/2014/main" id="{999D71F3-EB8B-2042-BA01-EA324C606EA9}"/>
+              </a:ext>
+            </a:extLst>
+          </p:cNvPr>
+          <p:cNvSpPr txBox="1"/>
+          <p:nvPr/>
+        </p:nvSpPr>
+        <p:spPr>
+          <a:xfrm>
+            <a:off x="1858928" y="5476062"/>
+            <a:ext cx="2012684" cy="284052"/>
+          </a:xfrm>
+          <a:prstGeom prst="rect">
+            <a:avLst/>
+          </a:prstGeom>
+          <a:solidFill>
+            <a:schemeClr val="bg1">
+              <a:alpha val="76000"/>
+            </a:schemeClr>
+          </a:solidFill>
+          <a:ln w="25400">
+            <a:noFill/>
+          </a:ln>
+        </p:spPr>
+        <p:txBody>
+          <a:bodyPr wrap="square" rtlCol="0">
+            <a:spAutoFit/>
+          </a:bodyPr>
+          <a:lstStyle/>
+          <a:p>
+            <a:pPr algn="ctr"/>
+            <a:r>
+              <a:rPr lang="en-US" sz="1246" dirty="0"/>
+              <a:t>implemented using</a:t>
+            </a:r>
+          </a:p>
+        </p:txBody>
+      </p:sp>
+      <p:sp>
+        <p:nvSpPr>
+          <p:cNvPr id="110" name="TextBox 109">
+            <a:extLst>
+              <a:ext uri="{FF2B5EF4-FFF2-40B4-BE49-F238E27FC236}">
+                <a16:creationId xmlns:a16="http://schemas.microsoft.com/office/drawing/2014/main" id="{53112421-FC78-154C-BBFC-FFAD7CD87A2E}"/>
+              </a:ext>
+            </a:extLst>
+          </p:cNvPr>
+          <p:cNvSpPr txBox="1"/>
+          <p:nvPr/>
+        </p:nvSpPr>
+        <p:spPr>
+          <a:xfrm>
+            <a:off x="4631871" y="5410882"/>
+            <a:ext cx="1106951" cy="475771"/>
+          </a:xfrm>
+          <a:prstGeom prst="rect">
+            <a:avLst/>
+          </a:prstGeom>
+          <a:solidFill>
+            <a:schemeClr val="bg1">
+              <a:alpha val="76000"/>
+            </a:schemeClr>
+          </a:solidFill>
+          <a:ln w="25400">
+            <a:noFill/>
+          </a:ln>
+        </p:spPr>
+        <p:txBody>
+          <a:bodyPr wrap="square" rtlCol="0">
+            <a:spAutoFit/>
+          </a:bodyPr>
+          <a:lstStyle/>
+          <a:p>
+            <a:pPr algn="ctr"/>
+            <a:r>
+              <a:rPr lang="en-US" sz="1246" dirty="0"/>
+              <a:t>implemented using</a:t>
+            </a:r>
+          </a:p>
+        </p:txBody>
+      </p:sp>
+      <p:sp>
+        <p:nvSpPr>
+          <p:cNvPr id="111" name="TextBox 110">
+            <a:extLst>
+              <a:ext uri="{FF2B5EF4-FFF2-40B4-BE49-F238E27FC236}">
+                <a16:creationId xmlns:a16="http://schemas.microsoft.com/office/drawing/2014/main" id="{EF20A067-7492-2F40-8655-83448095420A}"/>
+              </a:ext>
+            </a:extLst>
+          </p:cNvPr>
+          <p:cNvSpPr txBox="1"/>
+          <p:nvPr/>
+        </p:nvSpPr>
+        <p:spPr>
+          <a:xfrm>
+            <a:off x="6795186" y="329559"/>
+            <a:ext cx="938451" cy="475771"/>
+          </a:xfrm>
+          <a:prstGeom prst="rect">
+            <a:avLst/>
+          </a:prstGeom>
+          <a:noFill/>
+          <a:ln w="25400">
+            <a:solidFill>
+              <a:schemeClr val="accent6"/>
+            </a:solidFill>
+          </a:ln>
+        </p:spPr>
+        <p:txBody>
+          <a:bodyPr wrap="square" rtlCol="0">
+            <a:spAutoFit/>
+          </a:bodyPr>
+          <a:lstStyle/>
+          <a:p>
+            <a:pPr algn="ctr"/>
+            <a:r>
+              <a:rPr lang="en-US" sz="1246" dirty="0"/>
+              <a:t>Existing, </a:t>
+            </a:r>
+          </a:p>
+          <a:p>
+            <a:pPr algn="ctr"/>
+            <a:r>
+              <a:rPr lang="en-US" sz="1246" dirty="0"/>
+              <a:t>WIP</a:t>
+            </a:r>
+          </a:p>
+        </p:txBody>
+      </p:sp>
+      <p:sp>
+        <p:nvSpPr>
+          <p:cNvPr id="112" name="TextBox 111">
+            <a:extLst>
+              <a:ext uri="{FF2B5EF4-FFF2-40B4-BE49-F238E27FC236}">
+                <a16:creationId xmlns:a16="http://schemas.microsoft.com/office/drawing/2014/main" id="{A3C63388-E043-6144-BEDB-2A6C3C2FB79B}"/>
+              </a:ext>
+            </a:extLst>
+          </p:cNvPr>
+          <p:cNvSpPr txBox="1"/>
+          <p:nvPr/>
+        </p:nvSpPr>
+        <p:spPr>
+          <a:xfrm>
+            <a:off x="6795186" y="858063"/>
+            <a:ext cx="938451" cy="475771"/>
+          </a:xfrm>
+          <a:prstGeom prst="rect">
+            <a:avLst/>
+          </a:prstGeom>
+          <a:noFill/>
+          <a:ln w="25400">
+            <a:solidFill>
+              <a:schemeClr val="tx1"/>
+            </a:solidFill>
+          </a:ln>
+        </p:spPr>
+        <p:txBody>
+          <a:bodyPr wrap="square" rtlCol="0">
+            <a:spAutoFit/>
+          </a:bodyPr>
+          <a:lstStyle/>
+          <a:p>
+            <a:pPr algn="ctr"/>
+            <a:r>
+              <a:rPr lang="en-US" sz="1246" dirty="0"/>
+              <a:t>Existing, </a:t>
+            </a:r>
+          </a:p>
+          <a:p>
+            <a:pPr algn="ctr"/>
+            <a:r>
+              <a:rPr lang="en-US" sz="1246" dirty="0"/>
+              <a:t>stable</a:t>
+            </a:r>
+          </a:p>
+        </p:txBody>
+      </p:sp>
+      <p:sp>
+        <p:nvSpPr>
+          <p:cNvPr id="113" name="TextBox 112">
+            <a:extLst>
+              <a:ext uri="{FF2B5EF4-FFF2-40B4-BE49-F238E27FC236}">
+                <a16:creationId xmlns:a16="http://schemas.microsoft.com/office/drawing/2014/main" id="{BE274745-8722-9443-9BF8-592A0B00E0FC}"/>
+              </a:ext>
+            </a:extLst>
+          </p:cNvPr>
+          <p:cNvSpPr txBox="1"/>
+          <p:nvPr/>
+        </p:nvSpPr>
+        <p:spPr>
+          <a:xfrm>
+            <a:off x="6795187" y="1376198"/>
+            <a:ext cx="942413" cy="475771"/>
+          </a:xfrm>
+          <a:prstGeom prst="rect">
+            <a:avLst/>
+          </a:prstGeom>
+          <a:noFill/>
+          <a:ln w="25400">
+            <a:solidFill>
+              <a:schemeClr val="accent1"/>
+            </a:solidFill>
+          </a:ln>
+        </p:spPr>
+        <p:txBody>
+          <a:bodyPr wrap="square" rtlCol="0">
+            <a:spAutoFit/>
+          </a:bodyPr>
+          <a:lstStyle/>
+          <a:p>
+            <a:pPr algn="ctr"/>
+            <a:r>
+              <a:rPr lang="en-US" sz="1246" dirty="0"/>
+              <a:t>new </a:t>
+            </a:r>
+          </a:p>
+          <a:p>
+            <a:pPr algn="ctr"/>
+            <a:r>
+              <a:rPr lang="en-US" sz="1246" dirty="0"/>
+              <a:t>component</a:t>
+            </a:r>
+          </a:p>
+        </p:txBody>
+      </p:sp>
+      <p:sp>
+        <p:nvSpPr>
+          <p:cNvPr id="114" name="TextBox 113">
+            <a:extLst>
+              <a:ext uri="{FF2B5EF4-FFF2-40B4-BE49-F238E27FC236}">
+                <a16:creationId xmlns:a16="http://schemas.microsoft.com/office/drawing/2014/main" id="{63EFE54C-9553-7F44-9481-126EECB30BEA}"/>
+              </a:ext>
+            </a:extLst>
+          </p:cNvPr>
+          <p:cNvSpPr txBox="1"/>
+          <p:nvPr/>
+        </p:nvSpPr>
+        <p:spPr>
+          <a:xfrm>
+            <a:off x="6795186" y="1904702"/>
+            <a:ext cx="938451" cy="284052"/>
+          </a:xfrm>
+          <a:prstGeom prst="rect">
+            <a:avLst/>
+          </a:prstGeom>
+          <a:noFill/>
+          <a:ln w="25400">
+            <a:solidFill>
+              <a:srgbClr val="C00000"/>
+            </a:solidFill>
+          </a:ln>
+        </p:spPr>
+        <p:txBody>
+          <a:bodyPr wrap="square" rtlCol="0">
+            <a:spAutoFit/>
+          </a:bodyPr>
+          <a:lstStyle/>
+          <a:p>
+            <a:pPr algn="ctr"/>
+            <a:r>
+              <a:rPr lang="en-US" sz="1246" dirty="0"/>
+              <a:t>Error</a:t>
+            </a:r>
+          </a:p>
+        </p:txBody>
+      </p:sp>
+      <p:cxnSp>
+        <p:nvCxnSpPr>
+          <p:cNvPr id="115" name="Straight Arrow Connector 114">
+            <a:extLst>
+              <a:ext uri="{FF2B5EF4-FFF2-40B4-BE49-F238E27FC236}">
+                <a16:creationId xmlns:a16="http://schemas.microsoft.com/office/drawing/2014/main" id="{99386B09-659D-7F45-9C66-A021BDA5CA30}"/>
+              </a:ext>
+            </a:extLst>
+          </p:cNvPr>
+          <p:cNvCxnSpPr>
+            <a:cxnSpLocks/>
+            <a:stCxn id="8" idx="2"/>
+            <a:endCxn id="55" idx="0"/>
+          </p:cNvCxnSpPr>
+          <p:nvPr/>
+        </p:nvCxnSpPr>
+        <p:spPr>
+          <a:xfrm flipH="1">
+            <a:off x="5894228" y="2378801"/>
+            <a:ext cx="134861" cy="1219972"/>
+          </a:xfrm>
+          <a:prstGeom prst="straightConnector1">
+            <a:avLst/>
+          </a:prstGeom>
+          <a:ln w="25400">
+            <a:solidFill>
+              <a:schemeClr val="accent1"/>
+            </a:solidFill>
+            <a:tailEnd type="triangle"/>
+          </a:ln>
+        </p:spPr>
+        <p:style>
+          <a:lnRef idx="1">
+            <a:schemeClr val="accent1"/>
+          </a:lnRef>
+          <a:fillRef idx="0">
+            <a:schemeClr val="accent1"/>
+          </a:fillRef>
+          <a:effectRef idx="0">
+            <a:schemeClr val="accent1"/>
+          </a:effectRef>
+          <a:fontRef idx="minor">
+            <a:schemeClr val="tx1"/>
+          </a:fontRef>
+        </p:style>
+      </p:cxnSp>
+      <p:sp>
+        <p:nvSpPr>
+          <p:cNvPr id="128" name="TextBox 127">
+            <a:extLst>
+              <a:ext uri="{FF2B5EF4-FFF2-40B4-BE49-F238E27FC236}">
+                <a16:creationId xmlns:a16="http://schemas.microsoft.com/office/drawing/2014/main" id="{791FFFA3-C502-6041-A111-0C51B4E51A07}"/>
+              </a:ext>
+            </a:extLst>
+          </p:cNvPr>
+          <p:cNvSpPr txBox="1"/>
+          <p:nvPr/>
+        </p:nvSpPr>
+        <p:spPr>
+          <a:xfrm>
+            <a:off x="6758878" y="2739254"/>
+            <a:ext cx="974760" cy="461665"/>
+          </a:xfrm>
+          <a:prstGeom prst="rect">
+            <a:avLst/>
+          </a:prstGeom>
+          <a:noFill/>
+        </p:spPr>
+        <p:txBody>
+          <a:bodyPr wrap="square" rtlCol="0">
+            <a:spAutoFit/>
+          </a:bodyPr>
+          <a:lstStyle/>
+          <a:p>
+            <a:r>
+              <a:rPr lang="en-US" sz="1200" dirty="0"/>
+              <a:t>* Interpreter</a:t>
+            </a:r>
+          </a:p>
+          <a:p>
+            <a:r>
+              <a:rPr lang="en-US" sz="1200" dirty="0"/>
+              <a:t>   variants:</a:t>
+            </a:r>
+          </a:p>
+        </p:txBody>
+      </p:sp>
+      <p:sp>
+        <p:nvSpPr>
+          <p:cNvPr id="129" name="TextBox 128">
+            <a:extLst>
+              <a:ext uri="{FF2B5EF4-FFF2-40B4-BE49-F238E27FC236}">
+                <a16:creationId xmlns:a16="http://schemas.microsoft.com/office/drawing/2014/main" id="{276D851C-6C12-A640-A4CD-E1B8D518BF8F}"/>
+              </a:ext>
+            </a:extLst>
+          </p:cNvPr>
+          <p:cNvSpPr txBox="1"/>
+          <p:nvPr/>
+        </p:nvSpPr>
+        <p:spPr>
+          <a:xfrm>
+            <a:off x="6903130" y="3137764"/>
+            <a:ext cx="1040806" cy="646331"/>
+          </a:xfrm>
+          <a:prstGeom prst="rect">
+            <a:avLst/>
+          </a:prstGeom>
+          <a:noFill/>
+        </p:spPr>
+        <p:txBody>
+          <a:bodyPr wrap="square" rtlCol="0">
+            <a:spAutoFit/>
+          </a:bodyPr>
+          <a:lstStyle/>
+          <a:p>
+            <a:pPr marL="63450" indent="-75600" defTabSz="72000">
+              <a:buFont typeface="Arial" panose="020B0604020202020204" pitchFamily="34" charset="0"/>
+              <a:buChar char="•"/>
+            </a:pPr>
+            <a:r>
+              <a:rPr lang="en-US" sz="1200" dirty="0"/>
+              <a:t>Lazy (4.2)</a:t>
+            </a:r>
+          </a:p>
+          <a:p>
+            <a:pPr marL="63450" indent="-75600" defTabSz="72000">
+              <a:buFont typeface="Arial" panose="020B0604020202020204" pitchFamily="34" charset="0"/>
+              <a:buChar char="•"/>
+            </a:pPr>
+            <a:r>
+              <a:rPr lang="en-US" sz="1200" dirty="0"/>
+              <a:t>Non-</a:t>
+            </a:r>
+            <a:r>
+              <a:rPr lang="en-US" sz="1200" dirty="0" err="1"/>
+              <a:t>determ</a:t>
+            </a:r>
+            <a:r>
+              <a:rPr lang="en-US" sz="1200" dirty="0"/>
+              <a:t> (4.3)</a:t>
+            </a:r>
+          </a:p>
+        </p:txBody>
+      </p:sp>
+      <p:sp>
+        <p:nvSpPr>
+          <p:cNvPr id="130" name="TextBox 129">
+            <a:extLst>
+              <a:ext uri="{FF2B5EF4-FFF2-40B4-BE49-F238E27FC236}">
+                <a16:creationId xmlns:a16="http://schemas.microsoft.com/office/drawing/2014/main" id="{96DA1686-326C-0B4F-8C59-005DB4366297}"/>
+              </a:ext>
+            </a:extLst>
+          </p:cNvPr>
+          <p:cNvSpPr txBox="1"/>
+          <p:nvPr/>
+        </p:nvSpPr>
+        <p:spPr>
+          <a:xfrm>
+            <a:off x="6753170" y="3820417"/>
+            <a:ext cx="1496308" cy="461665"/>
+          </a:xfrm>
+          <a:prstGeom prst="rect">
+            <a:avLst/>
+          </a:prstGeom>
+          <a:noFill/>
+        </p:spPr>
+        <p:txBody>
+          <a:bodyPr wrap="square" rtlCol="0">
+            <a:spAutoFit/>
+          </a:bodyPr>
+          <a:lstStyle/>
+          <a:p>
+            <a:r>
+              <a:rPr lang="en-US" sz="1200" dirty="0"/>
+              <a:t>** Compiler/</a:t>
+            </a:r>
+          </a:p>
+          <a:p>
+            <a:r>
+              <a:rPr lang="en-US" sz="1200" dirty="0"/>
+              <a:t>      machine variants:</a:t>
+            </a:r>
+          </a:p>
+        </p:txBody>
+      </p:sp>
+      <p:sp>
+        <p:nvSpPr>
+          <p:cNvPr id="131" name="TextBox 130">
+            <a:extLst>
+              <a:ext uri="{FF2B5EF4-FFF2-40B4-BE49-F238E27FC236}">
+                <a16:creationId xmlns:a16="http://schemas.microsoft.com/office/drawing/2014/main" id="{648E8C5F-C3A7-104A-BD6F-F639EE17D59D}"/>
+              </a:ext>
+            </a:extLst>
+          </p:cNvPr>
+          <p:cNvSpPr txBox="1"/>
+          <p:nvPr/>
+        </p:nvSpPr>
+        <p:spPr>
+          <a:xfrm>
+            <a:off x="6897422" y="4258683"/>
+            <a:ext cx="954491" cy="461665"/>
+          </a:xfrm>
+          <a:prstGeom prst="rect">
+            <a:avLst/>
+          </a:prstGeom>
+          <a:noFill/>
+        </p:spPr>
+        <p:txBody>
+          <a:bodyPr wrap="square" rtlCol="0">
+            <a:spAutoFit/>
+          </a:bodyPr>
+          <a:lstStyle/>
+          <a:p>
+            <a:pPr marL="63450" indent="-75600" defTabSz="72000">
+              <a:buFont typeface="Arial" panose="020B0604020202020204" pitchFamily="34" charset="0"/>
+              <a:buChar char="•"/>
+            </a:pPr>
+            <a:r>
+              <a:rPr lang="en-US" sz="1200" dirty="0"/>
+              <a:t>Concurrent (3.4)</a:t>
+            </a:r>
+          </a:p>
+        </p:txBody>
+      </p:sp>
+      <p:sp>
+        <p:nvSpPr>
+          <p:cNvPr id="140" name="TextBox 139">
+            <a:extLst>
+              <a:ext uri="{FF2B5EF4-FFF2-40B4-BE49-F238E27FC236}">
+                <a16:creationId xmlns:a16="http://schemas.microsoft.com/office/drawing/2014/main" id="{55F94241-AB71-7B42-8F0C-FDB392589E2C}"/>
+              </a:ext>
+            </a:extLst>
+          </p:cNvPr>
+          <p:cNvSpPr txBox="1"/>
+          <p:nvPr/>
+        </p:nvSpPr>
+        <p:spPr>
+          <a:xfrm>
+            <a:off x="5811741" y="4823240"/>
+            <a:ext cx="941429" cy="475771"/>
+          </a:xfrm>
+          <a:prstGeom prst="rect">
+            <a:avLst/>
+          </a:prstGeom>
+          <a:noFill/>
+          <a:ln w="25400">
+            <a:solidFill>
+              <a:schemeClr val="accent1"/>
+            </a:solidFill>
+          </a:ln>
+        </p:spPr>
+        <p:txBody>
+          <a:bodyPr wrap="square" rtlCol="0">
+            <a:spAutoFit/>
+          </a:bodyPr>
+          <a:lstStyle/>
+          <a:p>
+            <a:pPr algn="ctr"/>
+            <a:r>
+              <a:rPr lang="en-US" sz="1246" dirty="0"/>
+              <a:t>SVML Assembler</a:t>
+            </a:r>
+          </a:p>
+        </p:txBody>
+      </p:sp>
+      <p:cxnSp>
+        <p:nvCxnSpPr>
+          <p:cNvPr id="146" name="Straight Arrow Connector 145">
+            <a:extLst>
+              <a:ext uri="{FF2B5EF4-FFF2-40B4-BE49-F238E27FC236}">
+                <a16:creationId xmlns:a16="http://schemas.microsoft.com/office/drawing/2014/main" id="{C9CB0F9E-3A62-E84B-BDF7-DD16D7EB10B3}"/>
+              </a:ext>
+            </a:extLst>
+          </p:cNvPr>
+          <p:cNvCxnSpPr>
+            <a:cxnSpLocks/>
+            <a:stCxn id="140" idx="2"/>
+            <a:endCxn id="54" idx="0"/>
+          </p:cNvCxnSpPr>
+          <p:nvPr/>
+        </p:nvCxnSpPr>
+        <p:spPr>
+          <a:xfrm flipH="1">
+            <a:off x="6282455" y="5299011"/>
+            <a:ext cx="1" cy="701886"/>
+          </a:xfrm>
+          <a:prstGeom prst="straightConnector1">
+            <a:avLst/>
+          </a:prstGeom>
+          <a:ln w="25400">
+            <a:solidFill>
+              <a:schemeClr val="tx1"/>
+            </a:solidFill>
+            <a:tailEnd type="triangle"/>
+          </a:ln>
+        </p:spPr>
+        <p:style>
+          <a:lnRef idx="1">
+            <a:schemeClr val="accent1"/>
+          </a:lnRef>
+          <a:fillRef idx="0">
+            <a:schemeClr val="accent1"/>
+          </a:fillRef>
+          <a:effectRef idx="0">
+            <a:schemeClr val="accent1"/>
+          </a:effectRef>
+          <a:fontRef idx="minor">
+            <a:schemeClr val="tx1"/>
+          </a:fontRef>
+        </p:style>
+      </p:cxnSp>
+      <p:sp>
+        <p:nvSpPr>
+          <p:cNvPr id="149" name="TextBox 148">
+            <a:extLst>
+              <a:ext uri="{FF2B5EF4-FFF2-40B4-BE49-F238E27FC236}">
+                <a16:creationId xmlns:a16="http://schemas.microsoft.com/office/drawing/2014/main" id="{00F9C91D-DEC2-CB41-9B20-8FB1A1DF5558}"/>
+              </a:ext>
+            </a:extLst>
+          </p:cNvPr>
+          <p:cNvSpPr txBox="1"/>
+          <p:nvPr/>
+        </p:nvSpPr>
+        <p:spPr>
+          <a:xfrm>
+            <a:off x="5999869" y="5409284"/>
+            <a:ext cx="582979" cy="475771"/>
+          </a:xfrm>
+          <a:prstGeom prst="rect">
+            <a:avLst/>
+          </a:prstGeom>
+          <a:solidFill>
+            <a:schemeClr val="bg1">
+              <a:alpha val="76000"/>
+            </a:schemeClr>
+          </a:solidFill>
+          <a:ln w="25400">
+            <a:noFill/>
+          </a:ln>
+        </p:spPr>
+        <p:txBody>
+          <a:bodyPr wrap="square" rtlCol="0">
+            <a:spAutoFit/>
+          </a:bodyPr>
+          <a:lstStyle/>
+          <a:p>
+            <a:pPr algn="ctr"/>
+            <a:r>
+              <a:rPr lang="en-US" sz="1246" dirty="0"/>
+              <a:t>byte code</a:t>
+            </a:r>
+          </a:p>
+        </p:txBody>
+      </p:sp>
+      <p:sp>
+        <p:nvSpPr>
+          <p:cNvPr id="25" name="TextBox 24">
+            <a:extLst>
+              <a:ext uri="{FF2B5EF4-FFF2-40B4-BE49-F238E27FC236}">
+                <a16:creationId xmlns:a16="http://schemas.microsoft.com/office/drawing/2014/main" id="{5178AA69-2610-0D4D-AB67-8EEFBBCB2AC2}"/>
+              </a:ext>
+            </a:extLst>
+          </p:cNvPr>
+          <p:cNvSpPr txBox="1"/>
+          <p:nvPr/>
+        </p:nvSpPr>
+        <p:spPr>
+          <a:xfrm>
+            <a:off x="3059161" y="1850071"/>
+            <a:ext cx="1012248" cy="284052"/>
+          </a:xfrm>
+          <a:prstGeom prst="rect">
+            <a:avLst/>
+          </a:prstGeom>
+          <a:solidFill>
+            <a:schemeClr val="bg1">
+              <a:alpha val="76000"/>
+            </a:schemeClr>
+          </a:solidFill>
+          <a:ln w="25400">
+            <a:noFill/>
+          </a:ln>
+        </p:spPr>
+        <p:txBody>
+          <a:bodyPr wrap="square" rtlCol="0">
+            <a:spAutoFit/>
+          </a:bodyPr>
+          <a:lstStyle>
+            <a:defPPr>
+              <a:defRPr lang="en-US"/>
+            </a:defPPr>
+            <a:lvl1pPr algn="ctr">
+              <a:defRPr sz="1246"/>
+            </a:lvl1pPr>
+          </a:lstStyle>
+          <a:p>
+            <a:r>
+              <a:rPr lang="en-US" dirty="0"/>
+              <a:t>syntax tree</a:t>
+            </a:r>
+          </a:p>
+        </p:txBody>
+      </p:sp>
+      <p:sp>
+        <p:nvSpPr>
+          <p:cNvPr id="27" name="TextBox 26">
+            <a:extLst>
+              <a:ext uri="{FF2B5EF4-FFF2-40B4-BE49-F238E27FC236}">
+                <a16:creationId xmlns:a16="http://schemas.microsoft.com/office/drawing/2014/main" id="{8A31928C-A87D-E746-89B9-9A3B69F7F4EE}"/>
+              </a:ext>
+            </a:extLst>
+          </p:cNvPr>
+          <p:cNvSpPr txBox="1"/>
+          <p:nvPr/>
+        </p:nvSpPr>
+        <p:spPr>
+          <a:xfrm>
+            <a:off x="5598245" y="1529393"/>
+            <a:ext cx="913008" cy="475771"/>
+          </a:xfrm>
+          <a:prstGeom prst="rect">
+            <a:avLst/>
+          </a:prstGeom>
+          <a:solidFill>
+            <a:schemeClr val="bg1">
+              <a:alpha val="76000"/>
+            </a:schemeClr>
+          </a:solidFill>
+          <a:ln w="25400">
+            <a:noFill/>
+          </a:ln>
+        </p:spPr>
+        <p:txBody>
+          <a:bodyPr wrap="square" rtlCol="0">
+            <a:spAutoFit/>
+          </a:bodyPr>
+          <a:lstStyle>
+            <a:defPPr>
+              <a:defRPr lang="en-US"/>
+            </a:defPPr>
+            <a:lvl1pPr algn="ctr">
+              <a:defRPr sz="1246"/>
+            </a:lvl1pPr>
+          </a:lstStyle>
+          <a:p>
+            <a:r>
+              <a:rPr lang="en-US" dirty="0"/>
+              <a:t>validated syntax tree</a:t>
+            </a:r>
+          </a:p>
+        </p:txBody>
+      </p:sp>
+      <p:cxnSp>
+        <p:nvCxnSpPr>
+          <p:cNvPr id="124" name="Straight Arrow Connector 123">
+            <a:extLst>
+              <a:ext uri="{FF2B5EF4-FFF2-40B4-BE49-F238E27FC236}">
+                <a16:creationId xmlns:a16="http://schemas.microsoft.com/office/drawing/2014/main" id="{7C161C17-9F25-1D45-BCD1-858425D19DB9}"/>
+              </a:ext>
+            </a:extLst>
+          </p:cNvPr>
+          <p:cNvCxnSpPr>
+            <a:cxnSpLocks/>
+            <a:stCxn id="8" idx="2"/>
+            <a:endCxn id="9" idx="0"/>
+          </p:cNvCxnSpPr>
+          <p:nvPr/>
+        </p:nvCxnSpPr>
+        <p:spPr>
+          <a:xfrm flipH="1">
+            <a:off x="3057676" y="2378801"/>
+            <a:ext cx="2971413" cy="1230035"/>
+          </a:xfrm>
+          <a:prstGeom prst="straightConnector1">
+            <a:avLst/>
+          </a:prstGeom>
+          <a:ln w="25400">
+            <a:solidFill>
+              <a:schemeClr val="accent1"/>
+            </a:solidFill>
+            <a:tailEnd type="triangle"/>
+          </a:ln>
+        </p:spPr>
+        <p:style>
+          <a:lnRef idx="1">
+            <a:schemeClr val="accent1"/>
+          </a:lnRef>
+          <a:fillRef idx="0">
+            <a:schemeClr val="accent1"/>
+          </a:fillRef>
+          <a:effectRef idx="0">
+            <a:schemeClr val="accent1"/>
+          </a:effectRef>
+          <a:fontRef idx="minor">
+            <a:schemeClr val="tx1"/>
+          </a:fontRef>
+        </p:style>
+      </p:cxnSp>
+      <p:cxnSp>
+        <p:nvCxnSpPr>
+          <p:cNvPr id="125" name="Straight Arrow Connector 124">
+            <a:extLst>
+              <a:ext uri="{FF2B5EF4-FFF2-40B4-BE49-F238E27FC236}">
+                <a16:creationId xmlns:a16="http://schemas.microsoft.com/office/drawing/2014/main" id="{E025ABE9-D0F8-1D46-959F-25FC162D0FA7}"/>
+              </a:ext>
+            </a:extLst>
+          </p:cNvPr>
+          <p:cNvCxnSpPr>
+            <a:cxnSpLocks/>
+            <a:stCxn id="8" idx="2"/>
+            <a:endCxn id="11" idx="0"/>
+          </p:cNvCxnSpPr>
+          <p:nvPr/>
+        </p:nvCxnSpPr>
+        <p:spPr>
+          <a:xfrm flipH="1">
+            <a:off x="3950248" y="2378801"/>
+            <a:ext cx="2078841" cy="1226288"/>
+          </a:xfrm>
+          <a:prstGeom prst="straightConnector1">
+            <a:avLst/>
+          </a:prstGeom>
+          <a:ln w="25400">
+            <a:solidFill>
+              <a:schemeClr val="accent1"/>
+            </a:solidFill>
+            <a:tailEnd type="triangle"/>
+          </a:ln>
+        </p:spPr>
+        <p:style>
+          <a:lnRef idx="1">
+            <a:schemeClr val="accent1"/>
+          </a:lnRef>
+          <a:fillRef idx="0">
+            <a:schemeClr val="accent1"/>
+          </a:fillRef>
+          <a:effectRef idx="0">
+            <a:schemeClr val="accent1"/>
+          </a:effectRef>
+          <a:fontRef idx="minor">
+            <a:schemeClr val="tx1"/>
+          </a:fontRef>
+        </p:style>
+      </p:cxnSp>
+      <p:cxnSp>
+        <p:nvCxnSpPr>
+          <p:cNvPr id="126" name="Straight Arrow Connector 125">
+            <a:extLst>
+              <a:ext uri="{FF2B5EF4-FFF2-40B4-BE49-F238E27FC236}">
+                <a16:creationId xmlns:a16="http://schemas.microsoft.com/office/drawing/2014/main" id="{7919B54D-C2E7-8B40-AF96-9A1236D0F8CC}"/>
+              </a:ext>
+            </a:extLst>
+          </p:cNvPr>
+          <p:cNvCxnSpPr>
+            <a:cxnSpLocks/>
+            <a:stCxn id="8" idx="2"/>
+            <a:endCxn id="40" idx="0"/>
+          </p:cNvCxnSpPr>
+          <p:nvPr/>
+        </p:nvCxnSpPr>
+        <p:spPr>
+          <a:xfrm flipH="1">
+            <a:off x="4912996" y="2378801"/>
+            <a:ext cx="1116093" cy="1225511"/>
+          </a:xfrm>
+          <a:prstGeom prst="straightConnector1">
+            <a:avLst/>
+          </a:prstGeom>
+          <a:ln w="25400">
+            <a:solidFill>
+              <a:schemeClr val="accent1"/>
+            </a:solidFill>
+            <a:tailEnd type="triangle"/>
+          </a:ln>
+        </p:spPr>
+        <p:style>
+          <a:lnRef idx="1">
+            <a:schemeClr val="accent1"/>
+          </a:lnRef>
+          <a:fillRef idx="0">
+            <a:schemeClr val="accent1"/>
+          </a:fillRef>
+          <a:effectRef idx="0">
+            <a:schemeClr val="accent1"/>
+          </a:effectRef>
+          <a:fontRef idx="minor">
+            <a:schemeClr val="tx1"/>
+          </a:fontRef>
+        </p:style>
+      </p:cxnSp>
+      <p:cxnSp>
+        <p:nvCxnSpPr>
+          <p:cNvPr id="136" name="Straight Arrow Connector 135">
+            <a:extLst>
+              <a:ext uri="{FF2B5EF4-FFF2-40B4-BE49-F238E27FC236}">
+                <a16:creationId xmlns:a16="http://schemas.microsoft.com/office/drawing/2014/main" id="{3B43C030-B7C4-1E4D-BE33-26ED2976190E}"/>
+              </a:ext>
+            </a:extLst>
+          </p:cNvPr>
+          <p:cNvCxnSpPr>
+            <a:cxnSpLocks/>
+            <a:stCxn id="8" idx="2"/>
+            <a:endCxn id="10" idx="0"/>
+          </p:cNvCxnSpPr>
+          <p:nvPr/>
+        </p:nvCxnSpPr>
+        <p:spPr>
+          <a:xfrm flipH="1">
+            <a:off x="2098264" y="2378801"/>
+            <a:ext cx="3930825" cy="1236051"/>
+          </a:xfrm>
+          <a:prstGeom prst="straightConnector1">
+            <a:avLst/>
+          </a:prstGeom>
+          <a:ln w="25400">
+            <a:solidFill>
+              <a:schemeClr val="accent1"/>
+            </a:solidFill>
+            <a:tailEnd type="triangle"/>
+          </a:ln>
+        </p:spPr>
+        <p:style>
+          <a:lnRef idx="1">
+            <a:schemeClr val="accent1"/>
+          </a:lnRef>
+          <a:fillRef idx="0">
+            <a:schemeClr val="accent1"/>
+          </a:fillRef>
+          <a:effectRef idx="0">
+            <a:schemeClr val="accent1"/>
+          </a:effectRef>
+          <a:fontRef idx="minor">
+            <a:schemeClr val="tx1"/>
+          </a:fontRef>
+        </p:style>
+      </p:cxnSp>
+      <p:sp>
+        <p:nvSpPr>
+          <p:cNvPr id="28" name="TextBox 27">
+            <a:extLst>
+              <a:ext uri="{FF2B5EF4-FFF2-40B4-BE49-F238E27FC236}">
+                <a16:creationId xmlns:a16="http://schemas.microsoft.com/office/drawing/2014/main" id="{5801D970-DC42-5544-A17F-B3BDD0E51380}"/>
+              </a:ext>
+            </a:extLst>
+          </p:cNvPr>
+          <p:cNvSpPr txBox="1"/>
+          <p:nvPr/>
+        </p:nvSpPr>
+        <p:spPr>
+          <a:xfrm>
+            <a:off x="4993527" y="2530339"/>
+            <a:ext cx="1187185" cy="475771"/>
+          </a:xfrm>
+          <a:prstGeom prst="rect">
+            <a:avLst/>
+          </a:prstGeom>
+          <a:solidFill>
+            <a:schemeClr val="bg1">
+              <a:alpha val="76000"/>
+            </a:schemeClr>
+          </a:solidFill>
+          <a:ln w="25400">
+            <a:noFill/>
+          </a:ln>
+        </p:spPr>
+        <p:txBody>
+          <a:bodyPr wrap="square" rtlCol="0">
+            <a:spAutoFit/>
+          </a:bodyPr>
+          <a:lstStyle/>
+          <a:p>
+            <a:pPr algn="ctr"/>
+            <a:r>
+              <a:rPr lang="en-US" sz="1246" dirty="0"/>
+              <a:t>type-annotated syntax tree</a:t>
+            </a:r>
+          </a:p>
+        </p:txBody>
+      </p:sp>
+      <p:cxnSp>
+        <p:nvCxnSpPr>
+          <p:cNvPr id="139" name="Straight Arrow Connector 138">
+            <a:extLst>
+              <a:ext uri="{FF2B5EF4-FFF2-40B4-BE49-F238E27FC236}">
+                <a16:creationId xmlns:a16="http://schemas.microsoft.com/office/drawing/2014/main" id="{8FE8A56C-F861-A34F-8666-67C4FD6DC01C}"/>
+              </a:ext>
+            </a:extLst>
+          </p:cNvPr>
+          <p:cNvCxnSpPr>
+            <a:cxnSpLocks/>
+            <a:stCxn id="6" idx="2"/>
+            <a:endCxn id="55" idx="0"/>
+          </p:cNvCxnSpPr>
+          <p:nvPr/>
+        </p:nvCxnSpPr>
+        <p:spPr>
+          <a:xfrm>
+            <a:off x="3408588" y="1409085"/>
+            <a:ext cx="2485640" cy="2189688"/>
+          </a:xfrm>
+          <a:prstGeom prst="straightConnector1">
+            <a:avLst/>
+          </a:prstGeom>
+          <a:ln w="25400">
+            <a:solidFill>
+              <a:schemeClr val="accent1"/>
             </a:solidFill>
             <a:tailEnd type="triangle"/>
           </a:ln>
@@ -4958,15 +6240,15 @@
           </p:cNvPr>
           <p:cNvCxnSpPr>
             <a:cxnSpLocks/>
-            <a:stCxn id="8" idx="3"/>
-            <a:endCxn id="35" idx="1"/>
+            <a:stCxn id="8" idx="2"/>
+            <a:endCxn id="35" idx="0"/>
           </p:cNvCxnSpPr>
           <p:nvPr/>
         </p:nvCxnSpPr>
         <p:spPr>
-          <a:xfrm flipV="1">
-            <a:off x="4149026" y="2849859"/>
-            <a:ext cx="987451" cy="7352"/>
+          <a:xfrm>
+            <a:off x="6029089" y="2378801"/>
+            <a:ext cx="305122" cy="442951"/>
           </a:xfrm>
           <a:prstGeom prst="straightConnector1">
             <a:avLst/>
@@ -4993,1075 +6275,51 @@
           </a:fontRef>
         </p:style>
       </p:cxnSp>
-      <p:cxnSp>
-        <p:nvCxnSpPr>
-          <p:cNvPr id="84" name="Straight Connector 83">
-            <a:extLst>
-              <a:ext uri="{FF2B5EF4-FFF2-40B4-BE49-F238E27FC236}">
-                <a16:creationId xmlns:a16="http://schemas.microsoft.com/office/drawing/2014/main" id="{3E201E5D-3A52-6240-944A-EC465034ABB4}"/>
-              </a:ext>
-            </a:extLst>
-          </p:cNvPr>
-          <p:cNvCxnSpPr>
-            <a:cxnSpLocks/>
-            <a:stCxn id="50" idx="2"/>
-            <a:endCxn id="53" idx="1"/>
-          </p:cNvCxnSpPr>
-          <p:nvPr/>
-        </p:nvCxnSpPr>
-        <p:spPr>
-          <a:xfrm>
-            <a:off x="1990648" y="5282931"/>
-            <a:ext cx="2014810" cy="967690"/>
-          </a:xfrm>
-          <a:prstGeom prst="line">
-            <a:avLst/>
-          </a:prstGeom>
-          <a:ln w="25400">
-            <a:solidFill>
-              <a:srgbClr val="7030A0"/>
-            </a:solidFill>
-          </a:ln>
-        </p:spPr>
-        <p:style>
-          <a:lnRef idx="1">
-            <a:schemeClr val="accent1"/>
-          </a:lnRef>
-          <a:fillRef idx="0">
-            <a:schemeClr val="accent1"/>
-          </a:fillRef>
-          <a:effectRef idx="0">
-            <a:schemeClr val="accent1"/>
-          </a:effectRef>
-          <a:fontRef idx="minor">
-            <a:schemeClr val="tx1"/>
-          </a:fontRef>
-        </p:style>
-      </p:cxnSp>
-      <p:cxnSp>
-        <p:nvCxnSpPr>
-          <p:cNvPr id="87" name="Straight Connector 86">
-            <a:extLst>
-              <a:ext uri="{FF2B5EF4-FFF2-40B4-BE49-F238E27FC236}">
-                <a16:creationId xmlns:a16="http://schemas.microsoft.com/office/drawing/2014/main" id="{81D3CE61-74AC-654E-A954-04F5A25871C2}"/>
-              </a:ext>
-            </a:extLst>
-          </p:cNvPr>
-          <p:cNvCxnSpPr>
-            <a:cxnSpLocks/>
-            <a:stCxn id="51" idx="2"/>
-            <a:endCxn id="53" idx="1"/>
-          </p:cNvCxnSpPr>
-          <p:nvPr/>
-        </p:nvCxnSpPr>
-        <p:spPr>
-          <a:xfrm>
-            <a:off x="2831934" y="5279553"/>
-            <a:ext cx="1173524" cy="971068"/>
-          </a:xfrm>
-          <a:prstGeom prst="line">
-            <a:avLst/>
-          </a:prstGeom>
-          <a:ln w="25400">
-            <a:solidFill>
-              <a:srgbClr val="7030A0"/>
-            </a:solidFill>
-          </a:ln>
-        </p:spPr>
-        <p:style>
-          <a:lnRef idx="1">
-            <a:schemeClr val="accent1"/>
-          </a:lnRef>
-          <a:fillRef idx="0">
-            <a:schemeClr val="accent1"/>
-          </a:fillRef>
-          <a:effectRef idx="0">
-            <a:schemeClr val="accent1"/>
-          </a:effectRef>
-          <a:fontRef idx="minor">
-            <a:schemeClr val="tx1"/>
-          </a:fontRef>
-        </p:style>
-      </p:cxnSp>
-      <p:cxnSp>
-        <p:nvCxnSpPr>
-          <p:cNvPr id="90" name="Straight Connector 89">
-            <a:extLst>
-              <a:ext uri="{FF2B5EF4-FFF2-40B4-BE49-F238E27FC236}">
-                <a16:creationId xmlns:a16="http://schemas.microsoft.com/office/drawing/2014/main" id="{23C39604-D793-BE47-8401-37EDF6F17520}"/>
-              </a:ext>
-            </a:extLst>
-          </p:cNvPr>
-          <p:cNvCxnSpPr>
-            <a:cxnSpLocks/>
-            <a:stCxn id="52" idx="2"/>
-            <a:endCxn id="53" idx="1"/>
-          </p:cNvCxnSpPr>
-          <p:nvPr/>
-        </p:nvCxnSpPr>
-        <p:spPr>
-          <a:xfrm>
-            <a:off x="3632134" y="5279553"/>
-            <a:ext cx="373324" cy="971068"/>
-          </a:xfrm>
-          <a:prstGeom prst="line">
-            <a:avLst/>
-          </a:prstGeom>
-          <a:ln w="25400">
-            <a:solidFill>
-              <a:srgbClr val="7030A0"/>
-            </a:solidFill>
-          </a:ln>
-        </p:spPr>
-        <p:style>
-          <a:lnRef idx="1">
-            <a:schemeClr val="accent1"/>
-          </a:lnRef>
-          <a:fillRef idx="0">
-            <a:schemeClr val="accent1"/>
-          </a:fillRef>
-          <a:effectRef idx="0">
-            <a:schemeClr val="accent1"/>
-          </a:effectRef>
-          <a:fontRef idx="minor">
-            <a:schemeClr val="tx1"/>
-          </a:fontRef>
-        </p:style>
-      </p:cxnSp>
-      <p:cxnSp>
-        <p:nvCxnSpPr>
-          <p:cNvPr id="93" name="Straight Connector 92">
-            <a:extLst>
-              <a:ext uri="{FF2B5EF4-FFF2-40B4-BE49-F238E27FC236}">
-                <a16:creationId xmlns:a16="http://schemas.microsoft.com/office/drawing/2014/main" id="{FF908778-6272-8948-952D-B59E8DD49D61}"/>
-              </a:ext>
-            </a:extLst>
-          </p:cNvPr>
-          <p:cNvCxnSpPr>
-            <a:cxnSpLocks/>
-            <a:stCxn id="61" idx="2"/>
-            <a:endCxn id="53" idx="3"/>
-          </p:cNvCxnSpPr>
-          <p:nvPr/>
-        </p:nvCxnSpPr>
-        <p:spPr>
-          <a:xfrm flipH="1">
-            <a:off x="4912996" y="5299010"/>
-            <a:ext cx="360756" cy="951611"/>
-          </a:xfrm>
-          <a:prstGeom prst="line">
-            <a:avLst/>
-          </a:prstGeom>
-          <a:ln w="25400">
-            <a:solidFill>
-              <a:srgbClr val="7030A0"/>
-            </a:solidFill>
-          </a:ln>
-        </p:spPr>
-        <p:style>
-          <a:lnRef idx="1">
-            <a:schemeClr val="accent1"/>
-          </a:lnRef>
-          <a:fillRef idx="0">
-            <a:schemeClr val="accent1"/>
-          </a:fillRef>
-          <a:effectRef idx="0">
-            <a:schemeClr val="accent1"/>
-          </a:effectRef>
-          <a:fontRef idx="minor">
-            <a:schemeClr val="tx1"/>
-          </a:fontRef>
-        </p:style>
-      </p:cxnSp>
-      <p:cxnSp>
-        <p:nvCxnSpPr>
-          <p:cNvPr id="96" name="Straight Arrow Connector 95">
-            <a:extLst>
-              <a:ext uri="{FF2B5EF4-FFF2-40B4-BE49-F238E27FC236}">
-                <a16:creationId xmlns:a16="http://schemas.microsoft.com/office/drawing/2014/main" id="{95061FDC-70AB-7C47-A338-B602D587B1B1}"/>
-              </a:ext>
-            </a:extLst>
-          </p:cNvPr>
-          <p:cNvCxnSpPr>
-            <a:cxnSpLocks/>
-            <a:stCxn id="33" idx="3"/>
-            <a:endCxn id="30" idx="1"/>
-          </p:cNvCxnSpPr>
-          <p:nvPr/>
-        </p:nvCxnSpPr>
-        <p:spPr>
-          <a:xfrm>
-            <a:off x="4149026" y="471983"/>
-            <a:ext cx="1007782" cy="397538"/>
-          </a:xfrm>
-          <a:prstGeom prst="straightConnector1">
-            <a:avLst/>
-          </a:prstGeom>
+      <p:sp>
+        <p:nvSpPr>
+          <p:cNvPr id="35" name="TextBox 34">
+            <a:extLst>
+              <a:ext uri="{FF2B5EF4-FFF2-40B4-BE49-F238E27FC236}">
+                <a16:creationId xmlns:a16="http://schemas.microsoft.com/office/drawing/2014/main" id="{A8BC5CD6-71E8-0D47-9932-1FBCF26859B0}"/>
+              </a:ext>
+            </a:extLst>
+          </p:cNvPr>
+          <p:cNvSpPr txBox="1"/>
+          <p:nvPr/>
+        </p:nvSpPr>
+        <p:spPr>
+          <a:xfrm>
+            <a:off x="6038480" y="2821752"/>
+            <a:ext cx="591461" cy="475771"/>
+          </a:xfrm>
+          <a:prstGeom prst="rect">
+            <a:avLst/>
+          </a:prstGeom>
+          <a:noFill/>
           <a:ln w="25400">
             <a:solidFill>
               <a:srgbClr val="C00000"/>
             </a:solidFill>
-            <a:tailEnd type="triangle"/>
-          </a:ln>
-        </p:spPr>
-        <p:style>
-          <a:lnRef idx="1">
-            <a:schemeClr val="accent1"/>
-          </a:lnRef>
-          <a:fillRef idx="0">
-            <a:schemeClr val="accent1"/>
-          </a:fillRef>
-          <a:effectRef idx="0">
-            <a:schemeClr val="accent1"/>
-          </a:effectRef>
-          <a:fontRef idx="minor">
-            <a:schemeClr val="tx1"/>
-          </a:fontRef>
-        </p:style>
-      </p:cxnSp>
-      <p:cxnSp>
-        <p:nvCxnSpPr>
-          <p:cNvPr id="99" name="Straight Connector 98">
-            <a:extLst>
-              <a:ext uri="{FF2B5EF4-FFF2-40B4-BE49-F238E27FC236}">
-                <a16:creationId xmlns:a16="http://schemas.microsoft.com/office/drawing/2014/main" id="{F47E7D87-7B53-8C42-872F-61C9456CBD58}"/>
-              </a:ext>
-            </a:extLst>
-          </p:cNvPr>
-          <p:cNvCxnSpPr>
-            <a:cxnSpLocks/>
-            <a:stCxn id="10" idx="2"/>
-            <a:endCxn id="50" idx="0"/>
-          </p:cNvCxnSpPr>
-          <p:nvPr/>
-        </p:nvCxnSpPr>
-        <p:spPr>
-          <a:xfrm flipH="1">
-            <a:off x="1990648" y="4074544"/>
-            <a:ext cx="107616" cy="748695"/>
-          </a:xfrm>
-          <a:prstGeom prst="line">
-            <a:avLst/>
-          </a:prstGeom>
-          <a:ln w="25400">
-            <a:solidFill>
-              <a:srgbClr val="7030A0"/>
-            </a:solidFill>
-          </a:ln>
-        </p:spPr>
-        <p:style>
-          <a:lnRef idx="1">
-            <a:schemeClr val="accent1"/>
-          </a:lnRef>
-          <a:fillRef idx="0">
-            <a:schemeClr val="accent1"/>
-          </a:fillRef>
-          <a:effectRef idx="0">
-            <a:schemeClr val="accent1"/>
-          </a:effectRef>
-          <a:fontRef idx="minor">
-            <a:schemeClr val="tx1"/>
-          </a:fontRef>
-        </p:style>
-      </p:cxnSp>
-      <p:cxnSp>
-        <p:nvCxnSpPr>
-          <p:cNvPr id="102" name="Straight Connector 101">
-            <a:extLst>
-              <a:ext uri="{FF2B5EF4-FFF2-40B4-BE49-F238E27FC236}">
-                <a16:creationId xmlns:a16="http://schemas.microsoft.com/office/drawing/2014/main" id="{F1B56F13-7783-4240-AEBA-C78DFE08663C}"/>
-              </a:ext>
-            </a:extLst>
-          </p:cNvPr>
-          <p:cNvCxnSpPr>
-            <a:cxnSpLocks/>
-            <a:stCxn id="10" idx="2"/>
-            <a:endCxn id="51" idx="0"/>
-          </p:cNvCxnSpPr>
-          <p:nvPr/>
-        </p:nvCxnSpPr>
-        <p:spPr>
-          <a:xfrm>
-            <a:off x="2098264" y="4074544"/>
-            <a:ext cx="733670" cy="745317"/>
-          </a:xfrm>
-          <a:prstGeom prst="line">
-            <a:avLst/>
-          </a:prstGeom>
-          <a:ln w="25400">
-            <a:solidFill>
-              <a:srgbClr val="7030A0"/>
-            </a:solidFill>
-          </a:ln>
-        </p:spPr>
-        <p:style>
-          <a:lnRef idx="1">
-            <a:schemeClr val="accent1"/>
-          </a:lnRef>
-          <a:fillRef idx="0">
-            <a:schemeClr val="accent1"/>
-          </a:fillRef>
-          <a:effectRef idx="0">
-            <a:schemeClr val="accent1"/>
-          </a:effectRef>
-          <a:fontRef idx="minor">
-            <a:schemeClr val="tx1"/>
-          </a:fontRef>
-        </p:style>
-      </p:cxnSp>
-      <p:cxnSp>
-        <p:nvCxnSpPr>
-          <p:cNvPr id="105" name="Straight Connector 104">
-            <a:extLst>
-              <a:ext uri="{FF2B5EF4-FFF2-40B4-BE49-F238E27FC236}">
-                <a16:creationId xmlns:a16="http://schemas.microsoft.com/office/drawing/2014/main" id="{BDC04963-951E-6A48-9B99-C6B1DE6CB8AE}"/>
-              </a:ext>
-            </a:extLst>
-          </p:cNvPr>
-          <p:cNvCxnSpPr>
-            <a:cxnSpLocks/>
-            <a:stCxn id="9" idx="2"/>
-            <a:endCxn id="52" idx="0"/>
-          </p:cNvCxnSpPr>
-          <p:nvPr/>
-        </p:nvCxnSpPr>
-        <p:spPr>
-          <a:xfrm>
-            <a:off x="3057676" y="4080081"/>
-            <a:ext cx="574458" cy="739780"/>
-          </a:xfrm>
-          <a:prstGeom prst="line">
-            <a:avLst/>
-          </a:prstGeom>
-          <a:ln w="25400">
-            <a:solidFill>
-              <a:srgbClr val="7030A0"/>
-            </a:solidFill>
-          </a:ln>
-        </p:spPr>
-        <p:style>
-          <a:lnRef idx="1">
-            <a:schemeClr val="accent1"/>
-          </a:lnRef>
-          <a:fillRef idx="0">
-            <a:schemeClr val="accent1"/>
-          </a:fillRef>
-          <a:effectRef idx="0">
-            <a:schemeClr val="accent1"/>
-          </a:effectRef>
-          <a:fontRef idx="minor">
-            <a:schemeClr val="tx1"/>
-          </a:fontRef>
-        </p:style>
-      </p:cxnSp>
-      <p:sp>
-        <p:nvSpPr>
-          <p:cNvPr id="108" name="TextBox 107">
-            <a:extLst>
-              <a:ext uri="{FF2B5EF4-FFF2-40B4-BE49-F238E27FC236}">
-                <a16:creationId xmlns:a16="http://schemas.microsoft.com/office/drawing/2014/main" id="{6B29116E-6C77-6544-81BA-B8133F71421A}"/>
-              </a:ext>
-            </a:extLst>
-          </p:cNvPr>
-          <p:cNvSpPr txBox="1"/>
-          <p:nvPr/>
-        </p:nvSpPr>
-        <p:spPr>
-          <a:xfrm>
-            <a:off x="1946546" y="4225497"/>
-            <a:ext cx="1472759" cy="284052"/>
-          </a:xfrm>
-          <a:prstGeom prst="rect">
-            <a:avLst/>
-          </a:prstGeom>
-          <a:solidFill>
-            <a:schemeClr val="bg1">
-              <a:alpha val="76000"/>
-            </a:schemeClr>
-          </a:solidFill>
-          <a:ln w="25400">
-            <a:noFill/>
           </a:ln>
         </p:spPr>
         <p:txBody>
           <a:bodyPr wrap="square" rtlCol="0">
             <a:spAutoFit/>
           </a:bodyPr>
-          <a:lstStyle/>
-          <a:p>
-            <a:pPr algn="ctr"/>
-            <a:r>
-              <a:rPr lang="en-US" sz="1246" dirty="0"/>
-              <a:t>interacting     with</a:t>
-            </a:r>
-          </a:p>
-        </p:txBody>
-      </p:sp>
-      <p:sp>
-        <p:nvSpPr>
-          <p:cNvPr id="109" name="TextBox 108">
-            <a:extLst>
-              <a:ext uri="{FF2B5EF4-FFF2-40B4-BE49-F238E27FC236}">
-                <a16:creationId xmlns:a16="http://schemas.microsoft.com/office/drawing/2014/main" id="{999D71F3-EB8B-2042-BA01-EA324C606EA9}"/>
-              </a:ext>
-            </a:extLst>
-          </p:cNvPr>
-          <p:cNvSpPr txBox="1"/>
-          <p:nvPr/>
-        </p:nvSpPr>
-        <p:spPr>
-          <a:xfrm>
-            <a:off x="1858928" y="5476062"/>
-            <a:ext cx="2012684" cy="284052"/>
-          </a:xfrm>
-          <a:prstGeom prst="rect">
-            <a:avLst/>
-          </a:prstGeom>
-          <a:solidFill>
-            <a:schemeClr val="bg1">
-              <a:alpha val="76000"/>
-            </a:schemeClr>
-          </a:solidFill>
-          <a:ln w="25400">
-            <a:noFill/>
-          </a:ln>
-        </p:spPr>
-        <p:txBody>
-          <a:bodyPr wrap="square" rtlCol="0">
-            <a:spAutoFit/>
-          </a:bodyPr>
-          <a:lstStyle/>
-          <a:p>
-            <a:pPr algn="ctr"/>
-            <a:r>
-              <a:rPr lang="en-US" sz="1246" dirty="0"/>
-              <a:t>implemented using</a:t>
-            </a:r>
-          </a:p>
-        </p:txBody>
-      </p:sp>
-      <p:sp>
-        <p:nvSpPr>
-          <p:cNvPr id="110" name="TextBox 109">
-            <a:extLst>
-              <a:ext uri="{FF2B5EF4-FFF2-40B4-BE49-F238E27FC236}">
-                <a16:creationId xmlns:a16="http://schemas.microsoft.com/office/drawing/2014/main" id="{53112421-FC78-154C-BBFC-FFAD7CD87A2E}"/>
-              </a:ext>
-            </a:extLst>
-          </p:cNvPr>
-          <p:cNvSpPr txBox="1"/>
-          <p:nvPr/>
-        </p:nvSpPr>
-        <p:spPr>
-          <a:xfrm>
-            <a:off x="4631871" y="5410882"/>
-            <a:ext cx="1106951" cy="475771"/>
-          </a:xfrm>
-          <a:prstGeom prst="rect">
-            <a:avLst/>
-          </a:prstGeom>
-          <a:solidFill>
-            <a:schemeClr val="bg1">
-              <a:alpha val="76000"/>
-            </a:schemeClr>
-          </a:solidFill>
-          <a:ln w="25400">
-            <a:noFill/>
-          </a:ln>
-        </p:spPr>
-        <p:txBody>
-          <a:bodyPr wrap="square" rtlCol="0">
-            <a:spAutoFit/>
-          </a:bodyPr>
-          <a:lstStyle/>
-          <a:p>
-            <a:pPr algn="ctr"/>
-            <a:r>
-              <a:rPr lang="en-US" sz="1246" dirty="0"/>
-              <a:t>implemented using</a:t>
-            </a:r>
-          </a:p>
-        </p:txBody>
-      </p:sp>
-      <p:sp>
-        <p:nvSpPr>
-          <p:cNvPr id="111" name="TextBox 110">
-            <a:extLst>
-              <a:ext uri="{FF2B5EF4-FFF2-40B4-BE49-F238E27FC236}">
-                <a16:creationId xmlns:a16="http://schemas.microsoft.com/office/drawing/2014/main" id="{EF20A067-7492-2F40-8655-83448095420A}"/>
-              </a:ext>
-            </a:extLst>
-          </p:cNvPr>
-          <p:cNvSpPr txBox="1"/>
-          <p:nvPr/>
-        </p:nvSpPr>
-        <p:spPr>
-          <a:xfrm>
-            <a:off x="6795186" y="329559"/>
-            <a:ext cx="938451" cy="475771"/>
-          </a:xfrm>
-          <a:prstGeom prst="rect">
-            <a:avLst/>
-          </a:prstGeom>
-          <a:noFill/>
-          <a:ln w="25400">
-            <a:solidFill>
-              <a:schemeClr val="accent6"/>
-            </a:solidFill>
-          </a:ln>
-        </p:spPr>
-        <p:txBody>
-          <a:bodyPr wrap="square" rtlCol="0">
-            <a:spAutoFit/>
-          </a:bodyPr>
-          <a:lstStyle/>
-          <a:p>
-            <a:pPr algn="ctr"/>
-            <a:r>
-              <a:rPr lang="en-US" sz="1246" dirty="0"/>
-              <a:t>Existing, </a:t>
-            </a:r>
-          </a:p>
-          <a:p>
-            <a:pPr algn="ctr"/>
-            <a:r>
-              <a:rPr lang="en-US" sz="1246" dirty="0"/>
-              <a:t>WIP</a:t>
-            </a:r>
-          </a:p>
-        </p:txBody>
-      </p:sp>
-      <p:sp>
-        <p:nvSpPr>
-          <p:cNvPr id="112" name="TextBox 111">
-            <a:extLst>
-              <a:ext uri="{FF2B5EF4-FFF2-40B4-BE49-F238E27FC236}">
-                <a16:creationId xmlns:a16="http://schemas.microsoft.com/office/drawing/2014/main" id="{A3C63388-E043-6144-BEDB-2A6C3C2FB79B}"/>
-              </a:ext>
-            </a:extLst>
-          </p:cNvPr>
-          <p:cNvSpPr txBox="1"/>
-          <p:nvPr/>
-        </p:nvSpPr>
-        <p:spPr>
-          <a:xfrm>
-            <a:off x="6795186" y="858063"/>
-            <a:ext cx="938451" cy="475771"/>
-          </a:xfrm>
-          <a:prstGeom prst="rect">
-            <a:avLst/>
-          </a:prstGeom>
-          <a:noFill/>
-          <a:ln w="25400">
-            <a:solidFill>
-              <a:schemeClr val="tx1"/>
-            </a:solidFill>
-          </a:ln>
-        </p:spPr>
-        <p:txBody>
-          <a:bodyPr wrap="square" rtlCol="0">
-            <a:spAutoFit/>
-          </a:bodyPr>
-          <a:lstStyle/>
-          <a:p>
-            <a:pPr algn="ctr"/>
-            <a:r>
-              <a:rPr lang="en-US" sz="1246" dirty="0"/>
-              <a:t>Existing, </a:t>
-            </a:r>
-          </a:p>
-          <a:p>
-            <a:pPr algn="ctr"/>
-            <a:r>
-              <a:rPr lang="en-US" sz="1246" dirty="0"/>
-              <a:t>stable</a:t>
-            </a:r>
-          </a:p>
-        </p:txBody>
-      </p:sp>
-      <p:sp>
-        <p:nvSpPr>
-          <p:cNvPr id="113" name="TextBox 112">
-            <a:extLst>
-              <a:ext uri="{FF2B5EF4-FFF2-40B4-BE49-F238E27FC236}">
-                <a16:creationId xmlns:a16="http://schemas.microsoft.com/office/drawing/2014/main" id="{BE274745-8722-9443-9BF8-592A0B00E0FC}"/>
-              </a:ext>
-            </a:extLst>
-          </p:cNvPr>
-          <p:cNvSpPr txBox="1"/>
-          <p:nvPr/>
-        </p:nvSpPr>
-        <p:spPr>
-          <a:xfrm>
-            <a:off x="6795187" y="1376198"/>
-            <a:ext cx="942413" cy="475771"/>
-          </a:xfrm>
-          <a:prstGeom prst="rect">
-            <a:avLst/>
-          </a:prstGeom>
-          <a:noFill/>
-          <a:ln w="25400">
-            <a:solidFill>
-              <a:schemeClr val="accent1"/>
-            </a:solidFill>
-          </a:ln>
-        </p:spPr>
-        <p:txBody>
-          <a:bodyPr wrap="square" rtlCol="0">
-            <a:spAutoFit/>
-          </a:bodyPr>
-          <a:lstStyle/>
-          <a:p>
-            <a:pPr algn="ctr"/>
-            <a:r>
-              <a:rPr lang="en-US" sz="1246" dirty="0"/>
-              <a:t>new </a:t>
-            </a:r>
-          </a:p>
-          <a:p>
-            <a:pPr algn="ctr"/>
-            <a:r>
-              <a:rPr lang="en-US" sz="1246" dirty="0"/>
-              <a:t>component</a:t>
-            </a:r>
-          </a:p>
-        </p:txBody>
-      </p:sp>
-      <p:sp>
-        <p:nvSpPr>
-          <p:cNvPr id="114" name="TextBox 113">
-            <a:extLst>
-              <a:ext uri="{FF2B5EF4-FFF2-40B4-BE49-F238E27FC236}">
-                <a16:creationId xmlns:a16="http://schemas.microsoft.com/office/drawing/2014/main" id="{63EFE54C-9553-7F44-9481-126EECB30BEA}"/>
-              </a:ext>
-            </a:extLst>
-          </p:cNvPr>
-          <p:cNvSpPr txBox="1"/>
-          <p:nvPr/>
-        </p:nvSpPr>
-        <p:spPr>
-          <a:xfrm>
-            <a:off x="6795186" y="1904702"/>
-            <a:ext cx="938451" cy="284052"/>
-          </a:xfrm>
-          <a:prstGeom prst="rect">
-            <a:avLst/>
-          </a:prstGeom>
-          <a:noFill/>
-          <a:ln w="25400">
-            <a:solidFill>
-              <a:srgbClr val="C00000"/>
-            </a:solidFill>
-          </a:ln>
-        </p:spPr>
-        <p:txBody>
-          <a:bodyPr wrap="square" rtlCol="0">
-            <a:spAutoFit/>
-          </a:bodyPr>
-          <a:lstStyle/>
-          <a:p>
-            <a:pPr algn="ctr"/>
-            <a:r>
-              <a:rPr lang="en-US" sz="1246" dirty="0"/>
-              <a:t>Error</a:t>
-            </a:r>
-          </a:p>
-        </p:txBody>
-      </p:sp>
-      <p:cxnSp>
-        <p:nvCxnSpPr>
-          <p:cNvPr id="115" name="Straight Arrow Connector 114">
-            <a:extLst>
-              <a:ext uri="{FF2B5EF4-FFF2-40B4-BE49-F238E27FC236}">
-                <a16:creationId xmlns:a16="http://schemas.microsoft.com/office/drawing/2014/main" id="{99386B09-659D-7F45-9C66-A021BDA5CA30}"/>
-              </a:ext>
-            </a:extLst>
-          </p:cNvPr>
-          <p:cNvCxnSpPr>
-            <a:cxnSpLocks/>
-            <a:stCxn id="8" idx="2"/>
-            <a:endCxn id="55" idx="0"/>
-          </p:cNvCxnSpPr>
-          <p:nvPr/>
-        </p:nvCxnSpPr>
-        <p:spPr>
-          <a:xfrm>
-            <a:off x="3408588" y="2999237"/>
-            <a:ext cx="2485640" cy="599536"/>
-          </a:xfrm>
-          <a:prstGeom prst="straightConnector1">
-            <a:avLst/>
-          </a:prstGeom>
-          <a:ln w="25400">
-            <a:solidFill>
-              <a:schemeClr val="tx1"/>
-            </a:solidFill>
-            <a:tailEnd type="triangle"/>
-          </a:ln>
-        </p:spPr>
-        <p:style>
-          <a:lnRef idx="1">
-            <a:schemeClr val="accent1"/>
-          </a:lnRef>
-          <a:fillRef idx="0">
-            <a:schemeClr val="accent1"/>
-          </a:fillRef>
-          <a:effectRef idx="0">
-            <a:schemeClr val="accent1"/>
-          </a:effectRef>
-          <a:fontRef idx="minor">
-            <a:schemeClr val="tx1"/>
-          </a:fontRef>
-        </p:style>
-      </p:cxnSp>
-      <p:sp>
-        <p:nvSpPr>
-          <p:cNvPr id="28" name="TextBox 27">
-            <a:extLst>
-              <a:ext uri="{FF2B5EF4-FFF2-40B4-BE49-F238E27FC236}">
-                <a16:creationId xmlns:a16="http://schemas.microsoft.com/office/drawing/2014/main" id="{5801D970-DC42-5544-A17F-B3BDD0E51380}"/>
-              </a:ext>
-            </a:extLst>
-          </p:cNvPr>
-          <p:cNvSpPr txBox="1"/>
-          <p:nvPr/>
-        </p:nvSpPr>
-        <p:spPr>
-          <a:xfrm>
-            <a:off x="2697894" y="3155704"/>
-            <a:ext cx="2012684" cy="284052"/>
-          </a:xfrm>
-          <a:prstGeom prst="rect">
-            <a:avLst/>
-          </a:prstGeom>
-          <a:solidFill>
-            <a:schemeClr val="bg1">
-              <a:alpha val="76000"/>
-            </a:schemeClr>
-          </a:solidFill>
-          <a:ln w="25400">
-            <a:noFill/>
-          </a:ln>
-        </p:spPr>
-        <p:txBody>
-          <a:bodyPr wrap="square" rtlCol="0">
-            <a:spAutoFit/>
-          </a:bodyPr>
-          <a:lstStyle/>
-          <a:p>
-            <a:pPr algn="ctr"/>
-            <a:r>
-              <a:rPr lang="en-US" sz="1246" dirty="0"/>
-              <a:t>type-annotated syntax tree</a:t>
-            </a:r>
-          </a:p>
-        </p:txBody>
-      </p:sp>
-      <p:sp>
-        <p:nvSpPr>
-          <p:cNvPr id="128" name="TextBox 127">
-            <a:extLst>
-              <a:ext uri="{FF2B5EF4-FFF2-40B4-BE49-F238E27FC236}">
-                <a16:creationId xmlns:a16="http://schemas.microsoft.com/office/drawing/2014/main" id="{791FFFA3-C502-6041-A111-0C51B4E51A07}"/>
-              </a:ext>
-            </a:extLst>
-          </p:cNvPr>
-          <p:cNvSpPr txBox="1"/>
-          <p:nvPr/>
-        </p:nvSpPr>
-        <p:spPr>
-          <a:xfrm>
-            <a:off x="6758878" y="2739254"/>
-            <a:ext cx="974760" cy="461665"/>
-          </a:xfrm>
-          <a:prstGeom prst="rect">
-            <a:avLst/>
-          </a:prstGeom>
-          <a:noFill/>
-        </p:spPr>
-        <p:txBody>
-          <a:bodyPr wrap="square" rtlCol="0">
-            <a:spAutoFit/>
-          </a:bodyPr>
-          <a:lstStyle/>
-          <a:p>
-            <a:r>
-              <a:rPr lang="en-US" sz="1200" dirty="0"/>
-              <a:t>* Interpreter</a:t>
-            </a:r>
-          </a:p>
-          <a:p>
-            <a:r>
-              <a:rPr lang="en-US" sz="1200" dirty="0"/>
-              <a:t>   variants:</a:t>
-            </a:r>
-          </a:p>
-        </p:txBody>
-      </p:sp>
-      <p:sp>
-        <p:nvSpPr>
-          <p:cNvPr id="129" name="TextBox 128">
-            <a:extLst>
-              <a:ext uri="{FF2B5EF4-FFF2-40B4-BE49-F238E27FC236}">
-                <a16:creationId xmlns:a16="http://schemas.microsoft.com/office/drawing/2014/main" id="{276D851C-6C12-A640-A4CD-E1B8D518BF8F}"/>
-              </a:ext>
-            </a:extLst>
-          </p:cNvPr>
-          <p:cNvSpPr txBox="1"/>
-          <p:nvPr/>
-        </p:nvSpPr>
-        <p:spPr>
-          <a:xfrm>
-            <a:off x="6903130" y="3137764"/>
-            <a:ext cx="1040806" cy="646331"/>
-          </a:xfrm>
-          <a:prstGeom prst="rect">
-            <a:avLst/>
-          </a:prstGeom>
-          <a:noFill/>
-        </p:spPr>
-        <p:txBody>
-          <a:bodyPr wrap="square" rtlCol="0">
-            <a:spAutoFit/>
-          </a:bodyPr>
-          <a:lstStyle/>
-          <a:p>
-            <a:pPr marL="63450" indent="-75600" defTabSz="72000">
-              <a:buFont typeface="Arial" panose="020B0604020202020204" pitchFamily="34" charset="0"/>
-              <a:buChar char="•"/>
-            </a:pPr>
-            <a:r>
-              <a:rPr lang="en-US" sz="1200" dirty="0"/>
-              <a:t>Lazy (4.2)</a:t>
-            </a:r>
-          </a:p>
-          <a:p>
-            <a:pPr marL="63450" indent="-75600" defTabSz="72000">
-              <a:buFont typeface="Arial" panose="020B0604020202020204" pitchFamily="34" charset="0"/>
-              <a:buChar char="•"/>
-            </a:pPr>
-            <a:r>
-              <a:rPr lang="en-US" sz="1200" dirty="0"/>
-              <a:t>Non-</a:t>
-            </a:r>
-            <a:r>
-              <a:rPr lang="en-US" sz="1200" dirty="0" err="1"/>
-              <a:t>determ</a:t>
-            </a:r>
-            <a:r>
-              <a:rPr lang="en-US" sz="1200" dirty="0"/>
-              <a:t> (4.3)</a:t>
-            </a:r>
-          </a:p>
-        </p:txBody>
-      </p:sp>
-      <p:sp>
-        <p:nvSpPr>
-          <p:cNvPr id="130" name="TextBox 129">
-            <a:extLst>
-              <a:ext uri="{FF2B5EF4-FFF2-40B4-BE49-F238E27FC236}">
-                <a16:creationId xmlns:a16="http://schemas.microsoft.com/office/drawing/2014/main" id="{96DA1686-326C-0B4F-8C59-005DB4366297}"/>
-              </a:ext>
-            </a:extLst>
-          </p:cNvPr>
-          <p:cNvSpPr txBox="1"/>
-          <p:nvPr/>
-        </p:nvSpPr>
-        <p:spPr>
-          <a:xfrm>
-            <a:off x="6753170" y="3820417"/>
-            <a:ext cx="1496308" cy="461665"/>
-          </a:xfrm>
-          <a:prstGeom prst="rect">
-            <a:avLst/>
-          </a:prstGeom>
-          <a:noFill/>
-        </p:spPr>
-        <p:txBody>
-          <a:bodyPr wrap="square" rtlCol="0">
-            <a:spAutoFit/>
-          </a:bodyPr>
-          <a:lstStyle/>
-          <a:p>
-            <a:r>
-              <a:rPr lang="en-US" sz="1200" dirty="0"/>
-              <a:t>** Compiler/</a:t>
-            </a:r>
-          </a:p>
-          <a:p>
-            <a:r>
-              <a:rPr lang="en-US" sz="1200" dirty="0"/>
-              <a:t>      machine variants:</a:t>
-            </a:r>
-          </a:p>
-        </p:txBody>
-      </p:sp>
-      <p:sp>
-        <p:nvSpPr>
-          <p:cNvPr id="131" name="TextBox 130">
-            <a:extLst>
-              <a:ext uri="{FF2B5EF4-FFF2-40B4-BE49-F238E27FC236}">
-                <a16:creationId xmlns:a16="http://schemas.microsoft.com/office/drawing/2014/main" id="{648E8C5F-C3A7-104A-BD6F-F639EE17D59D}"/>
-              </a:ext>
-            </a:extLst>
-          </p:cNvPr>
-          <p:cNvSpPr txBox="1"/>
-          <p:nvPr/>
-        </p:nvSpPr>
-        <p:spPr>
-          <a:xfrm>
-            <a:off x="6897422" y="4258683"/>
-            <a:ext cx="954491" cy="461665"/>
-          </a:xfrm>
-          <a:prstGeom prst="rect">
-            <a:avLst/>
-          </a:prstGeom>
-          <a:noFill/>
-        </p:spPr>
-        <p:txBody>
-          <a:bodyPr wrap="square" rtlCol="0">
-            <a:spAutoFit/>
-          </a:bodyPr>
-          <a:lstStyle/>
-          <a:p>
-            <a:pPr marL="63450" indent="-75600" defTabSz="72000">
-              <a:buFont typeface="Arial" panose="020B0604020202020204" pitchFamily="34" charset="0"/>
-              <a:buChar char="•"/>
-            </a:pPr>
-            <a:r>
-              <a:rPr lang="en-US" sz="1200" dirty="0"/>
-              <a:t>Concurrent (3.4)</a:t>
-            </a:r>
-          </a:p>
-        </p:txBody>
-      </p:sp>
-      <p:sp>
-        <p:nvSpPr>
-          <p:cNvPr id="140" name="TextBox 139">
-            <a:extLst>
-              <a:ext uri="{FF2B5EF4-FFF2-40B4-BE49-F238E27FC236}">
-                <a16:creationId xmlns:a16="http://schemas.microsoft.com/office/drawing/2014/main" id="{55F94241-AB71-7B42-8F0C-FDB392589E2C}"/>
-              </a:ext>
-            </a:extLst>
-          </p:cNvPr>
-          <p:cNvSpPr txBox="1"/>
-          <p:nvPr/>
-        </p:nvSpPr>
-        <p:spPr>
-          <a:xfrm>
-            <a:off x="5811741" y="4823240"/>
-            <a:ext cx="941429" cy="475771"/>
-          </a:xfrm>
-          <a:prstGeom prst="rect">
-            <a:avLst/>
-          </a:prstGeom>
-          <a:noFill/>
-          <a:ln w="25400">
-            <a:solidFill>
-              <a:schemeClr val="accent1"/>
-            </a:solidFill>
-          </a:ln>
-        </p:spPr>
-        <p:txBody>
-          <a:bodyPr wrap="square" rtlCol="0">
-            <a:spAutoFit/>
-          </a:bodyPr>
-          <a:lstStyle/>
-          <a:p>
-            <a:pPr algn="ctr"/>
-            <a:r>
-              <a:rPr lang="en-US" sz="1246" dirty="0"/>
-              <a:t>SVML Assembler</a:t>
-            </a:r>
-          </a:p>
-        </p:txBody>
-      </p:sp>
-      <p:cxnSp>
-        <p:nvCxnSpPr>
-          <p:cNvPr id="146" name="Straight Arrow Connector 145">
-            <a:extLst>
-              <a:ext uri="{FF2B5EF4-FFF2-40B4-BE49-F238E27FC236}">
-                <a16:creationId xmlns:a16="http://schemas.microsoft.com/office/drawing/2014/main" id="{C9CB0F9E-3A62-E84B-BDF7-DD16D7EB10B3}"/>
-              </a:ext>
-            </a:extLst>
-          </p:cNvPr>
-          <p:cNvCxnSpPr>
-            <a:cxnSpLocks/>
-            <a:stCxn id="140" idx="2"/>
-            <a:endCxn id="54" idx="0"/>
-          </p:cNvCxnSpPr>
-          <p:nvPr/>
-        </p:nvCxnSpPr>
-        <p:spPr>
-          <a:xfrm flipH="1">
-            <a:off x="6282455" y="5299011"/>
-            <a:ext cx="1" cy="701886"/>
-          </a:xfrm>
-          <a:prstGeom prst="straightConnector1">
-            <a:avLst/>
-          </a:prstGeom>
-          <a:ln w="25400">
-            <a:solidFill>
-              <a:schemeClr val="tx1"/>
-            </a:solidFill>
-            <a:tailEnd type="triangle"/>
-          </a:ln>
-        </p:spPr>
-        <p:style>
-          <a:lnRef idx="1">
-            <a:schemeClr val="accent1"/>
-          </a:lnRef>
-          <a:fillRef idx="0">
-            <a:schemeClr val="accent1"/>
-          </a:fillRef>
-          <a:effectRef idx="0">
-            <a:schemeClr val="accent1"/>
-          </a:effectRef>
-          <a:fontRef idx="minor">
-            <a:schemeClr val="tx1"/>
-          </a:fontRef>
-        </p:style>
-      </p:cxnSp>
-      <p:sp>
-        <p:nvSpPr>
-          <p:cNvPr id="149" name="TextBox 148">
-            <a:extLst>
-              <a:ext uri="{FF2B5EF4-FFF2-40B4-BE49-F238E27FC236}">
-                <a16:creationId xmlns:a16="http://schemas.microsoft.com/office/drawing/2014/main" id="{00F9C91D-DEC2-CB41-9B20-8FB1A1DF5558}"/>
-              </a:ext>
-            </a:extLst>
-          </p:cNvPr>
-          <p:cNvSpPr txBox="1"/>
-          <p:nvPr/>
-        </p:nvSpPr>
-        <p:spPr>
-          <a:xfrm>
-            <a:off x="5999869" y="5409284"/>
-            <a:ext cx="582979" cy="475771"/>
-          </a:xfrm>
-          <a:prstGeom prst="rect">
-            <a:avLst/>
-          </a:prstGeom>
-          <a:solidFill>
-            <a:schemeClr val="bg1">
-              <a:alpha val="76000"/>
-            </a:schemeClr>
-          </a:solidFill>
-          <a:ln w="25400">
-            <a:noFill/>
-          </a:ln>
-        </p:spPr>
-        <p:txBody>
-          <a:bodyPr wrap="square" rtlCol="0">
-            <a:spAutoFit/>
-          </a:bodyPr>
-          <a:lstStyle/>
-          <a:p>
-            <a:pPr algn="ctr"/>
-            <a:r>
-              <a:rPr lang="en-US" sz="1246" dirty="0"/>
-              <a:t>byte code</a:t>
-            </a:r>
+          <a:lstStyle>
+            <a:defPPr>
+              <a:defRPr lang="en-US"/>
+            </a:defPPr>
+            <a:lvl1pPr algn="ctr">
+              <a:defRPr sz="1246"/>
+            </a:lvl1pPr>
+          </a:lstStyle>
+          <a:p>
+            <a:r>
+              <a:rPr lang="en-US"/>
+              <a:t>Type Error</a:t>
+            </a:r>
+            <a:endParaRPr lang="en-US" dirty="0"/>
           </a:p>
         </p:txBody>
       </p:sp>

</xml_diff>